<commit_message>
Little change and powerpoint made
</commit_message>
<xml_diff>
--- a/notes/Tic Tac Toe GUI.pptx
+++ b/notes/Tic Tac Toe GUI.pptx
@@ -10,8 +10,12 @@
     <p:sldId id="257" r:id="rId4"/>
     <p:sldId id="259" r:id="rId5"/>
     <p:sldId id="261" r:id="rId6"/>
-    <p:sldId id="260" r:id="rId7"/>
-    <p:sldId id="262" r:id="rId8"/>
+    <p:sldId id="266" r:id="rId7"/>
+    <p:sldId id="260" r:id="rId8"/>
+    <p:sldId id="262" r:id="rId9"/>
+    <p:sldId id="264" r:id="rId10"/>
+    <p:sldId id="265" r:id="rId11"/>
+    <p:sldId id="267" r:id="rId12"/>
   </p:sldIdLst>
   <p:sldSz cx="12192000" cy="6858000"/>
   <p:notesSz cx="6858000" cy="9144000"/>
@@ -6096,8 +6100,8 @@
           <a:lstStyle/>
           <a:p>
             <a:r>
-              <a:rPr lang="da-DK" sz="1600"/>
-              <a:t>Af: Birk, Kasper, Karl og Stig</a:t>
+              <a:rPr lang="da-DK" sz="1600" dirty="0"/>
+              <a:t>Af Birk, Kasper, Karl og Stig</a:t>
             </a:r>
           </a:p>
         </p:txBody>
@@ -6742,6 +6746,954 @@
 </p:sld>
 </file>
 
+<file path=ppt/slides/slide10.xml><?xml version="1.0" encoding="utf-8"?>
+<p:sld xmlns:a="http://schemas.openxmlformats.org/drawingml/2006/main" xmlns:r="http://schemas.openxmlformats.org/officeDocument/2006/relationships" xmlns:p="http://schemas.openxmlformats.org/presentationml/2006/main">
+  <p:cSld>
+    <p:spTree>
+      <p:nvGrpSpPr>
+        <p:cNvPr id="1" name=""/>
+        <p:cNvGrpSpPr/>
+        <p:nvPr/>
+      </p:nvGrpSpPr>
+      <p:grpSpPr>
+        <a:xfrm>
+          <a:off x="0" y="0"/>
+          <a:ext cx="0" cy="0"/>
+          <a:chOff x="0" y="0"/>
+          <a:chExt cx="0" cy="0"/>
+        </a:xfrm>
+      </p:grpSpPr>
+      <p:sp>
+        <p:nvSpPr>
+          <p:cNvPr id="2" name="Titel 1">
+            <a:extLst>
+              <a:ext uri="{FF2B5EF4-FFF2-40B4-BE49-F238E27FC236}">
+                <a16:creationId xmlns:a16="http://schemas.microsoft.com/office/drawing/2014/main" id="{50107011-7B81-46F9-85FD-9BD36A1D6855}"/>
+              </a:ext>
+            </a:extLst>
+          </p:cNvPr>
+          <p:cNvSpPr>
+            <a:spLocks noGrp="1"/>
+          </p:cNvSpPr>
+          <p:nvPr>
+            <p:ph type="title"/>
+          </p:nvPr>
+        </p:nvSpPr>
+        <p:spPr/>
+        <p:txBody>
+          <a:bodyPr/>
+          <a:lstStyle/>
+          <a:p>
+            <a:r>
+              <a:rPr lang="da-DK" dirty="0"/>
+              <a:t>Valg af spiller og start</a:t>
+            </a:r>
+          </a:p>
+        </p:txBody>
+      </p:sp>
+      <p:sp>
+        <p:nvSpPr>
+          <p:cNvPr id="3" name="Pladsholder til indhold 2">
+            <a:extLst>
+              <a:ext uri="{FF2B5EF4-FFF2-40B4-BE49-F238E27FC236}">
+                <a16:creationId xmlns:a16="http://schemas.microsoft.com/office/drawing/2014/main" id="{9A6D9907-D1E1-4EFC-B5C5-BCE4E54CDD03}"/>
+              </a:ext>
+            </a:extLst>
+          </p:cNvPr>
+          <p:cNvSpPr>
+            <a:spLocks noGrp="1"/>
+          </p:cNvSpPr>
+          <p:nvPr>
+            <p:ph idx="1"/>
+          </p:nvPr>
+        </p:nvSpPr>
+        <p:spPr>
+          <a:xfrm>
+            <a:off x="677334" y="1270000"/>
+            <a:ext cx="8596668" cy="3880773"/>
+          </a:xfrm>
+        </p:spPr>
+        <p:txBody>
+          <a:bodyPr>
+            <a:noAutofit/>
+          </a:bodyPr>
+          <a:lstStyle/>
+          <a:p>
+            <a:pPr>
+              <a:lnSpc>
+                <a:spcPct val="120000"/>
+              </a:lnSpc>
+              <a:spcBef>
+                <a:spcPts val="0"/>
+              </a:spcBef>
+              <a:buFont typeface="+mj-lt"/>
+              <a:buAutoNum type="arabicPeriod" startAt="88"/>
+            </a:pPr>
+            <a:r>
+              <a:rPr lang="da-DK" sz="1100" dirty="0"/>
+              <a:t>public </a:t>
+            </a:r>
+            <a:r>
+              <a:rPr lang="da-DK" sz="1100" dirty="0" err="1"/>
+              <a:t>void</a:t>
+            </a:r>
+            <a:r>
+              <a:rPr lang="da-DK" sz="1100" dirty="0"/>
+              <a:t> </a:t>
+            </a:r>
+            <a:r>
+              <a:rPr lang="da-DK" sz="1100" dirty="0" err="1"/>
+              <a:t>StartGame</a:t>
+            </a:r>
+            <a:r>
+              <a:rPr lang="da-DK" sz="1100" dirty="0"/>
+              <a:t>()</a:t>
+            </a:r>
+          </a:p>
+          <a:p>
+            <a:pPr>
+              <a:lnSpc>
+                <a:spcPct val="120000"/>
+              </a:lnSpc>
+              <a:spcBef>
+                <a:spcPts val="0"/>
+              </a:spcBef>
+              <a:buFont typeface="+mj-lt"/>
+              <a:buAutoNum type="arabicPeriod" startAt="88"/>
+            </a:pPr>
+            <a:r>
+              <a:rPr lang="da-DK" sz="1100" dirty="0"/>
+              <a:t>    {</a:t>
+            </a:r>
+          </a:p>
+          <a:p>
+            <a:pPr>
+              <a:lnSpc>
+                <a:spcPct val="120000"/>
+              </a:lnSpc>
+              <a:spcBef>
+                <a:spcPts val="0"/>
+              </a:spcBef>
+              <a:buFont typeface="+mj-lt"/>
+              <a:buAutoNum type="arabicPeriod" startAt="88"/>
+            </a:pPr>
+            <a:r>
+              <a:rPr lang="da-DK" sz="1100" dirty="0"/>
+              <a:t>        </a:t>
+            </a:r>
+            <a:r>
+              <a:rPr lang="da-DK" sz="1100" dirty="0" err="1"/>
+              <a:t>currentGame</a:t>
+            </a:r>
+            <a:r>
+              <a:rPr lang="da-DK" sz="1100" dirty="0"/>
+              <a:t> = </a:t>
+            </a:r>
+            <a:r>
+              <a:rPr lang="da-DK" sz="1100" dirty="0" err="1"/>
+              <a:t>MakeNewGame</a:t>
+            </a:r>
+            <a:r>
+              <a:rPr lang="da-DK" sz="1100" dirty="0"/>
+              <a:t>();</a:t>
+            </a:r>
+          </a:p>
+          <a:p>
+            <a:pPr>
+              <a:lnSpc>
+                <a:spcPct val="120000"/>
+              </a:lnSpc>
+              <a:spcBef>
+                <a:spcPts val="0"/>
+              </a:spcBef>
+              <a:buFont typeface="+mj-lt"/>
+              <a:buAutoNum type="arabicPeriod" startAt="88"/>
+            </a:pPr>
+            <a:r>
+              <a:rPr lang="da-DK" sz="1100" dirty="0"/>
+              <a:t>        </a:t>
+            </a:r>
+            <a:r>
+              <a:rPr lang="da-DK" sz="1100" dirty="0" err="1"/>
+              <a:t>choosingScreen.SetActive</a:t>
+            </a:r>
+            <a:r>
+              <a:rPr lang="da-DK" sz="1100" dirty="0"/>
+              <a:t>(false);</a:t>
+            </a:r>
+          </a:p>
+          <a:p>
+            <a:pPr>
+              <a:lnSpc>
+                <a:spcPct val="120000"/>
+              </a:lnSpc>
+              <a:spcBef>
+                <a:spcPts val="0"/>
+              </a:spcBef>
+              <a:buFont typeface="+mj-lt"/>
+              <a:buAutoNum type="arabicPeriod" startAt="88"/>
+            </a:pPr>
+            <a:r>
+              <a:rPr lang="da-DK" sz="1100" dirty="0"/>
+              <a:t>        </a:t>
+            </a:r>
+            <a:r>
+              <a:rPr lang="da-DK" sz="1100" dirty="0" err="1"/>
+              <a:t>playingScreen.SetActive</a:t>
+            </a:r>
+            <a:r>
+              <a:rPr lang="da-DK" sz="1100" dirty="0"/>
+              <a:t>(true);</a:t>
+            </a:r>
+          </a:p>
+          <a:p>
+            <a:pPr>
+              <a:lnSpc>
+                <a:spcPct val="120000"/>
+              </a:lnSpc>
+              <a:spcBef>
+                <a:spcPts val="0"/>
+              </a:spcBef>
+              <a:buFont typeface="+mj-lt"/>
+              <a:buAutoNum type="arabicPeriod" startAt="88"/>
+            </a:pPr>
+            <a:r>
+              <a:rPr lang="da-DK" sz="1100" dirty="0"/>
+              <a:t>        </a:t>
+            </a:r>
+            <a:r>
+              <a:rPr lang="da-DK" sz="1100" dirty="0" err="1"/>
+              <a:t>NextMove</a:t>
+            </a:r>
+            <a:r>
+              <a:rPr lang="da-DK" sz="1100" dirty="0"/>
+              <a:t>(</a:t>
+            </a:r>
+            <a:r>
+              <a:rPr lang="da-DK" sz="1100" dirty="0" err="1"/>
+              <a:t>xIsAI</a:t>
+            </a:r>
+            <a:r>
+              <a:rPr lang="da-DK" sz="1100" dirty="0"/>
+              <a:t>);</a:t>
+            </a:r>
+          </a:p>
+          <a:p>
+            <a:pPr>
+              <a:lnSpc>
+                <a:spcPct val="120000"/>
+              </a:lnSpc>
+              <a:spcBef>
+                <a:spcPts val="0"/>
+              </a:spcBef>
+              <a:buFont typeface="+mj-lt"/>
+              <a:buAutoNum type="arabicPeriod" startAt="88"/>
+            </a:pPr>
+            <a:r>
+              <a:rPr lang="da-DK" sz="1100" dirty="0"/>
+              <a:t>    }</a:t>
+            </a:r>
+          </a:p>
+          <a:p>
+            <a:pPr>
+              <a:lnSpc>
+                <a:spcPct val="120000"/>
+              </a:lnSpc>
+              <a:spcBef>
+                <a:spcPts val="0"/>
+              </a:spcBef>
+              <a:buFont typeface="+mj-lt"/>
+              <a:buAutoNum type="arabicPeriod" startAt="88"/>
+            </a:pPr>
+            <a:endParaRPr lang="da-DK" sz="1100" dirty="0"/>
+          </a:p>
+          <a:p>
+            <a:pPr>
+              <a:lnSpc>
+                <a:spcPct val="120000"/>
+              </a:lnSpc>
+              <a:spcBef>
+                <a:spcPts val="0"/>
+              </a:spcBef>
+              <a:buFont typeface="+mj-lt"/>
+              <a:buAutoNum type="arabicPeriod" startAt="104"/>
+            </a:pPr>
+            <a:r>
+              <a:rPr lang="da-DK" sz="1100" dirty="0"/>
+              <a:t>Game </a:t>
+            </a:r>
+            <a:r>
+              <a:rPr lang="da-DK" sz="1100" dirty="0" err="1"/>
+              <a:t>MakeNewGame</a:t>
+            </a:r>
+            <a:r>
+              <a:rPr lang="da-DK" sz="1100" dirty="0"/>
+              <a:t>()</a:t>
+            </a:r>
+          </a:p>
+          <a:p>
+            <a:pPr>
+              <a:lnSpc>
+                <a:spcPct val="120000"/>
+              </a:lnSpc>
+              <a:spcBef>
+                <a:spcPts val="0"/>
+              </a:spcBef>
+              <a:buFont typeface="+mj-lt"/>
+              <a:buAutoNum type="arabicPeriod" startAt="104"/>
+            </a:pPr>
+            <a:r>
+              <a:rPr lang="da-DK" sz="1100" dirty="0"/>
+              <a:t>    {</a:t>
+            </a:r>
+          </a:p>
+          <a:p>
+            <a:pPr>
+              <a:lnSpc>
+                <a:spcPct val="120000"/>
+              </a:lnSpc>
+              <a:spcBef>
+                <a:spcPts val="0"/>
+              </a:spcBef>
+              <a:buFont typeface="+mj-lt"/>
+              <a:buAutoNum type="arabicPeriod" startAt="104"/>
+            </a:pPr>
+            <a:r>
+              <a:rPr lang="da-DK" sz="1100" dirty="0"/>
+              <a:t>        </a:t>
+            </a:r>
+            <a:r>
+              <a:rPr lang="da-DK" sz="1100" dirty="0" err="1"/>
+              <a:t>if</a:t>
+            </a:r>
+            <a:r>
+              <a:rPr lang="da-DK" sz="1100" dirty="0"/>
+              <a:t> (</a:t>
+            </a:r>
+            <a:r>
+              <a:rPr lang="da-DK" sz="1100" dirty="0" err="1"/>
+              <a:t>playerOneDropdown.value</a:t>
+            </a:r>
+            <a:r>
+              <a:rPr lang="da-DK" sz="1100" dirty="0"/>
+              <a:t> == 0)</a:t>
+            </a:r>
+          </a:p>
+          <a:p>
+            <a:pPr>
+              <a:lnSpc>
+                <a:spcPct val="120000"/>
+              </a:lnSpc>
+              <a:spcBef>
+                <a:spcPts val="0"/>
+              </a:spcBef>
+              <a:buFont typeface="+mj-lt"/>
+              <a:buAutoNum type="arabicPeriod" startAt="104"/>
+            </a:pPr>
+            <a:r>
+              <a:rPr lang="da-DK" sz="1100" dirty="0"/>
+              <a:t>        {</a:t>
+            </a:r>
+          </a:p>
+          <a:p>
+            <a:pPr>
+              <a:lnSpc>
+                <a:spcPct val="120000"/>
+              </a:lnSpc>
+              <a:spcBef>
+                <a:spcPts val="0"/>
+              </a:spcBef>
+              <a:buFont typeface="+mj-lt"/>
+              <a:buAutoNum type="arabicPeriod" startAt="104"/>
+            </a:pPr>
+            <a:r>
+              <a:rPr lang="da-DK" sz="1100" dirty="0"/>
+              <a:t>            </a:t>
+            </a:r>
+            <a:r>
+              <a:rPr lang="da-DK" sz="1100" dirty="0" err="1"/>
+              <a:t>playerOne</a:t>
+            </a:r>
+            <a:r>
+              <a:rPr lang="da-DK" sz="1100" dirty="0"/>
+              <a:t> = new </a:t>
+            </a:r>
+            <a:r>
+              <a:rPr lang="da-DK" sz="1100" dirty="0" err="1"/>
+              <a:t>UiIplayer</a:t>
+            </a:r>
+            <a:r>
+              <a:rPr lang="da-DK" sz="1100" dirty="0"/>
+              <a:t>(</a:t>
+            </a:r>
+            <a:r>
+              <a:rPr lang="da-DK" sz="1100" dirty="0" err="1"/>
+              <a:t>this</a:t>
+            </a:r>
+            <a:r>
+              <a:rPr lang="da-DK" sz="1100" dirty="0"/>
+              <a:t>);</a:t>
+            </a:r>
+          </a:p>
+          <a:p>
+            <a:pPr>
+              <a:lnSpc>
+                <a:spcPct val="120000"/>
+              </a:lnSpc>
+              <a:spcBef>
+                <a:spcPts val="0"/>
+              </a:spcBef>
+              <a:buFont typeface="+mj-lt"/>
+              <a:buAutoNum type="arabicPeriod" startAt="104"/>
+            </a:pPr>
+            <a:r>
+              <a:rPr lang="da-DK" sz="1100" dirty="0"/>
+              <a:t>        }</a:t>
+            </a:r>
+            <a:r>
+              <a:rPr lang="da-DK" sz="1100" dirty="0" err="1"/>
+              <a:t>else</a:t>
+            </a:r>
+            <a:endParaRPr lang="da-DK" sz="1100" dirty="0"/>
+          </a:p>
+          <a:p>
+            <a:pPr>
+              <a:lnSpc>
+                <a:spcPct val="120000"/>
+              </a:lnSpc>
+              <a:spcBef>
+                <a:spcPts val="0"/>
+              </a:spcBef>
+              <a:buFont typeface="+mj-lt"/>
+              <a:buAutoNum type="arabicPeriod" startAt="104"/>
+            </a:pPr>
+            <a:r>
+              <a:rPr lang="da-DK" sz="1100" dirty="0"/>
+              <a:t>        {</a:t>
+            </a:r>
+          </a:p>
+          <a:p>
+            <a:pPr>
+              <a:lnSpc>
+                <a:spcPct val="120000"/>
+              </a:lnSpc>
+              <a:spcBef>
+                <a:spcPts val="0"/>
+              </a:spcBef>
+              <a:buFont typeface="+mj-lt"/>
+              <a:buAutoNum type="arabicPeriod" startAt="104"/>
+            </a:pPr>
+            <a:r>
+              <a:rPr lang="da-DK" sz="1100" dirty="0"/>
+              <a:t>            </a:t>
+            </a:r>
+            <a:r>
+              <a:rPr lang="da-DK" sz="1100" dirty="0" err="1"/>
+              <a:t>playerOne</a:t>
+            </a:r>
+            <a:r>
+              <a:rPr lang="da-DK" sz="1100" dirty="0"/>
+              <a:t> = new </a:t>
+            </a:r>
+            <a:r>
+              <a:rPr lang="da-DK" sz="1100" dirty="0" err="1"/>
+              <a:t>UffeAIPlayer</a:t>
+            </a:r>
+            <a:r>
+              <a:rPr lang="da-DK" sz="1100" dirty="0"/>
+              <a:t>();</a:t>
+            </a:r>
+          </a:p>
+          <a:p>
+            <a:pPr>
+              <a:lnSpc>
+                <a:spcPct val="120000"/>
+              </a:lnSpc>
+              <a:spcBef>
+                <a:spcPts val="0"/>
+              </a:spcBef>
+              <a:buFont typeface="+mj-lt"/>
+              <a:buAutoNum type="arabicPeriod" startAt="104"/>
+            </a:pPr>
+            <a:r>
+              <a:rPr lang="da-DK" sz="1100" dirty="0"/>
+              <a:t>            </a:t>
+            </a:r>
+            <a:r>
+              <a:rPr lang="da-DK" sz="1100" dirty="0" err="1"/>
+              <a:t>xIsAI</a:t>
+            </a:r>
+            <a:r>
+              <a:rPr lang="da-DK" sz="1100" dirty="0"/>
+              <a:t> = true;</a:t>
+            </a:r>
+          </a:p>
+          <a:p>
+            <a:pPr>
+              <a:lnSpc>
+                <a:spcPct val="120000"/>
+              </a:lnSpc>
+              <a:spcBef>
+                <a:spcPts val="0"/>
+              </a:spcBef>
+              <a:buFont typeface="+mj-lt"/>
+              <a:buAutoNum type="arabicPeriod" startAt="104"/>
+            </a:pPr>
+            <a:r>
+              <a:rPr lang="da-DK" sz="1100" dirty="0"/>
+              <a:t>        }</a:t>
+            </a:r>
+          </a:p>
+          <a:p>
+            <a:pPr>
+              <a:lnSpc>
+                <a:spcPct val="120000"/>
+              </a:lnSpc>
+              <a:spcBef>
+                <a:spcPts val="0"/>
+              </a:spcBef>
+              <a:buFont typeface="+mj-lt"/>
+              <a:buAutoNum type="arabicPeriod" startAt="104"/>
+            </a:pPr>
+            <a:r>
+              <a:rPr lang="da-DK" sz="1100" dirty="0"/>
+              <a:t>        </a:t>
+            </a:r>
+            <a:r>
+              <a:rPr lang="da-DK" sz="1100" dirty="0" err="1"/>
+              <a:t>if</a:t>
+            </a:r>
+            <a:r>
+              <a:rPr lang="da-DK" sz="1100" dirty="0"/>
+              <a:t> (</a:t>
+            </a:r>
+            <a:r>
+              <a:rPr lang="da-DK" sz="1100" dirty="0" err="1"/>
+              <a:t>playerTwoDropdown.value</a:t>
+            </a:r>
+            <a:r>
+              <a:rPr lang="da-DK" sz="1100" dirty="0"/>
+              <a:t> == 0)</a:t>
+            </a:r>
+          </a:p>
+          <a:p>
+            <a:pPr>
+              <a:lnSpc>
+                <a:spcPct val="120000"/>
+              </a:lnSpc>
+              <a:spcBef>
+                <a:spcPts val="0"/>
+              </a:spcBef>
+              <a:buFont typeface="+mj-lt"/>
+              <a:buAutoNum type="arabicPeriod" startAt="104"/>
+            </a:pPr>
+            <a:r>
+              <a:rPr lang="da-DK" sz="1100" dirty="0"/>
+              <a:t>        {</a:t>
+            </a:r>
+          </a:p>
+          <a:p>
+            <a:pPr>
+              <a:lnSpc>
+                <a:spcPct val="120000"/>
+              </a:lnSpc>
+              <a:spcBef>
+                <a:spcPts val="0"/>
+              </a:spcBef>
+              <a:buFont typeface="+mj-lt"/>
+              <a:buAutoNum type="arabicPeriod" startAt="104"/>
+            </a:pPr>
+            <a:r>
+              <a:rPr lang="da-DK" sz="1100" dirty="0"/>
+              <a:t>            </a:t>
+            </a:r>
+            <a:r>
+              <a:rPr lang="da-DK" sz="1100" dirty="0" err="1"/>
+              <a:t>playerTwo</a:t>
+            </a:r>
+            <a:r>
+              <a:rPr lang="da-DK" sz="1100" dirty="0"/>
+              <a:t> = new </a:t>
+            </a:r>
+            <a:r>
+              <a:rPr lang="da-DK" sz="1100" dirty="0" err="1"/>
+              <a:t>UiIplayer</a:t>
+            </a:r>
+            <a:r>
+              <a:rPr lang="da-DK" sz="1100" dirty="0"/>
+              <a:t>(</a:t>
+            </a:r>
+            <a:r>
+              <a:rPr lang="da-DK" sz="1100" dirty="0" err="1"/>
+              <a:t>this</a:t>
+            </a:r>
+            <a:r>
+              <a:rPr lang="da-DK" sz="1100" dirty="0"/>
+              <a:t>);</a:t>
+            </a:r>
+          </a:p>
+          <a:p>
+            <a:pPr>
+              <a:lnSpc>
+                <a:spcPct val="120000"/>
+              </a:lnSpc>
+              <a:spcBef>
+                <a:spcPts val="0"/>
+              </a:spcBef>
+              <a:buFont typeface="+mj-lt"/>
+              <a:buAutoNum type="arabicPeriod" startAt="104"/>
+            </a:pPr>
+            <a:r>
+              <a:rPr lang="da-DK" sz="1100" dirty="0"/>
+              <a:t>        }</a:t>
+            </a:r>
+            <a:r>
+              <a:rPr lang="da-DK" sz="1100" dirty="0" err="1"/>
+              <a:t>else</a:t>
+            </a:r>
+            <a:endParaRPr lang="da-DK" sz="1100" dirty="0"/>
+          </a:p>
+          <a:p>
+            <a:pPr>
+              <a:lnSpc>
+                <a:spcPct val="120000"/>
+              </a:lnSpc>
+              <a:spcBef>
+                <a:spcPts val="0"/>
+              </a:spcBef>
+              <a:buFont typeface="+mj-lt"/>
+              <a:buAutoNum type="arabicPeriod" startAt="104"/>
+            </a:pPr>
+            <a:r>
+              <a:rPr lang="da-DK" sz="1100" dirty="0"/>
+              <a:t>        {</a:t>
+            </a:r>
+          </a:p>
+          <a:p>
+            <a:pPr>
+              <a:lnSpc>
+                <a:spcPct val="120000"/>
+              </a:lnSpc>
+              <a:spcBef>
+                <a:spcPts val="0"/>
+              </a:spcBef>
+              <a:buFont typeface="+mj-lt"/>
+              <a:buAutoNum type="arabicPeriod" startAt="104"/>
+            </a:pPr>
+            <a:r>
+              <a:rPr lang="da-DK" sz="1100" dirty="0"/>
+              <a:t>            </a:t>
+            </a:r>
+            <a:r>
+              <a:rPr lang="da-DK" sz="1100" dirty="0" err="1"/>
+              <a:t>playerTwo</a:t>
+            </a:r>
+            <a:r>
+              <a:rPr lang="da-DK" sz="1100" dirty="0"/>
+              <a:t> = new </a:t>
+            </a:r>
+            <a:r>
+              <a:rPr lang="da-DK" sz="1100" dirty="0" err="1"/>
+              <a:t>UffeAIPlayer</a:t>
+            </a:r>
+            <a:r>
+              <a:rPr lang="da-DK" sz="1100" dirty="0"/>
+              <a:t>();</a:t>
+            </a:r>
+          </a:p>
+          <a:p>
+            <a:pPr>
+              <a:lnSpc>
+                <a:spcPct val="120000"/>
+              </a:lnSpc>
+              <a:spcBef>
+                <a:spcPts val="0"/>
+              </a:spcBef>
+              <a:buFont typeface="+mj-lt"/>
+              <a:buAutoNum type="arabicPeriod" startAt="104"/>
+            </a:pPr>
+            <a:r>
+              <a:rPr lang="da-DK" sz="1100" dirty="0"/>
+              <a:t>        }</a:t>
+            </a:r>
+          </a:p>
+          <a:p>
+            <a:pPr>
+              <a:lnSpc>
+                <a:spcPct val="120000"/>
+              </a:lnSpc>
+              <a:spcBef>
+                <a:spcPts val="0"/>
+              </a:spcBef>
+              <a:buFont typeface="+mj-lt"/>
+              <a:buAutoNum type="arabicPeriod" startAt="104"/>
+            </a:pPr>
+            <a:r>
+              <a:rPr lang="en-US" sz="1100" dirty="0"/>
+              <a:t>        return new Game(</a:t>
+            </a:r>
+            <a:r>
+              <a:rPr lang="en-US" sz="1100" dirty="0" err="1"/>
+              <a:t>playerOne</a:t>
+            </a:r>
+            <a:r>
+              <a:rPr lang="en-US" sz="1100" dirty="0"/>
+              <a:t>, </a:t>
+            </a:r>
+            <a:r>
+              <a:rPr lang="en-US" sz="1100" dirty="0" err="1"/>
+              <a:t>playerTwo</a:t>
+            </a:r>
+            <a:r>
+              <a:rPr lang="en-US" sz="1100" dirty="0"/>
+              <a:t>);</a:t>
+            </a:r>
+          </a:p>
+          <a:p>
+            <a:pPr>
+              <a:lnSpc>
+                <a:spcPct val="120000"/>
+              </a:lnSpc>
+              <a:spcBef>
+                <a:spcPts val="0"/>
+              </a:spcBef>
+              <a:buFont typeface="+mj-lt"/>
+              <a:buAutoNum type="arabicPeriod" startAt="104"/>
+            </a:pPr>
+            <a:r>
+              <a:rPr lang="da-DK" sz="1100" dirty="0"/>
+              <a:t>    }</a:t>
+            </a:r>
+          </a:p>
+        </p:txBody>
+      </p:sp>
+    </p:spTree>
+    <p:extLst>
+      <p:ext uri="{BB962C8B-B14F-4D97-AF65-F5344CB8AC3E}">
+        <p14:creationId xmlns:p14="http://schemas.microsoft.com/office/powerpoint/2010/main" val="2454145905"/>
+      </p:ext>
+    </p:extLst>
+  </p:cSld>
+  <p:clrMapOvr>
+    <a:masterClrMapping/>
+  </p:clrMapOvr>
+</p:sld>
+</file>
+
+<file path=ppt/slides/slide11.xml><?xml version="1.0" encoding="utf-8"?>
+<p:sld xmlns:a="http://schemas.openxmlformats.org/drawingml/2006/main" xmlns:r="http://schemas.openxmlformats.org/officeDocument/2006/relationships" xmlns:p="http://schemas.openxmlformats.org/presentationml/2006/main">
+  <p:cSld>
+    <p:spTree>
+      <p:nvGrpSpPr>
+        <p:cNvPr id="1" name=""/>
+        <p:cNvGrpSpPr/>
+        <p:nvPr/>
+      </p:nvGrpSpPr>
+      <p:grpSpPr>
+        <a:xfrm>
+          <a:off x="0" y="0"/>
+          <a:ext cx="0" cy="0"/>
+          <a:chOff x="0" y="0"/>
+          <a:chExt cx="0" cy="0"/>
+        </a:xfrm>
+      </p:grpSpPr>
+      <p:sp>
+        <p:nvSpPr>
+          <p:cNvPr id="2" name="Titel 1">
+            <a:extLst>
+              <a:ext uri="{FF2B5EF4-FFF2-40B4-BE49-F238E27FC236}">
+                <a16:creationId xmlns:a16="http://schemas.microsoft.com/office/drawing/2014/main" id="{AC941F8B-E5F9-477B-8EDC-CB4050D313B7}"/>
+              </a:ext>
+            </a:extLst>
+          </p:cNvPr>
+          <p:cNvSpPr>
+            <a:spLocks noGrp="1"/>
+          </p:cNvSpPr>
+          <p:nvPr>
+            <p:ph type="title"/>
+          </p:nvPr>
+        </p:nvSpPr>
+        <p:spPr/>
+        <p:txBody>
+          <a:bodyPr/>
+          <a:lstStyle/>
+          <a:p>
+            <a:r>
+              <a:rPr lang="da-DK" dirty="0"/>
+              <a:t>Restart Game</a:t>
+            </a:r>
+          </a:p>
+        </p:txBody>
+      </p:sp>
+      <p:sp>
+        <p:nvSpPr>
+          <p:cNvPr id="3" name="Pladsholder til indhold 2">
+            <a:extLst>
+              <a:ext uri="{FF2B5EF4-FFF2-40B4-BE49-F238E27FC236}">
+                <a16:creationId xmlns:a16="http://schemas.microsoft.com/office/drawing/2014/main" id="{A8B81BB8-2BB9-429B-A9A0-5A138CB5D7DD}"/>
+              </a:ext>
+            </a:extLst>
+          </p:cNvPr>
+          <p:cNvSpPr>
+            <a:spLocks noGrp="1"/>
+          </p:cNvSpPr>
+          <p:nvPr>
+            <p:ph idx="1"/>
+          </p:nvPr>
+        </p:nvSpPr>
+        <p:spPr/>
+        <p:txBody>
+          <a:bodyPr/>
+          <a:lstStyle/>
+          <a:p>
+            <a:pPr>
+              <a:buFont typeface="+mj-lt"/>
+              <a:buAutoNum type="arabicPeriod" startAt="96"/>
+            </a:pPr>
+            <a:r>
+              <a:rPr lang="da-DK" dirty="0"/>
+              <a:t>public </a:t>
+            </a:r>
+            <a:r>
+              <a:rPr lang="da-DK" dirty="0" err="1"/>
+              <a:t>void</a:t>
+            </a:r>
+            <a:r>
+              <a:rPr lang="da-DK" dirty="0"/>
+              <a:t> </a:t>
+            </a:r>
+            <a:r>
+              <a:rPr lang="da-DK" dirty="0" err="1"/>
+              <a:t>RestartGame</a:t>
+            </a:r>
+            <a:r>
+              <a:rPr lang="da-DK" dirty="0"/>
+              <a:t>()</a:t>
+            </a:r>
+          </a:p>
+          <a:p>
+            <a:pPr>
+              <a:buFont typeface="+mj-lt"/>
+              <a:buAutoNum type="arabicPeriod" startAt="96"/>
+            </a:pPr>
+            <a:r>
+              <a:rPr lang="da-DK" dirty="0"/>
+              <a:t>    {</a:t>
+            </a:r>
+          </a:p>
+          <a:p>
+            <a:pPr>
+              <a:buFont typeface="+mj-lt"/>
+              <a:buAutoNum type="arabicPeriod" startAt="96"/>
+            </a:pPr>
+            <a:r>
+              <a:rPr lang="da-DK" dirty="0"/>
+              <a:t>        </a:t>
+            </a:r>
+            <a:r>
+              <a:rPr lang="da-DK" dirty="0" err="1"/>
+              <a:t>userHasPressed</a:t>
+            </a:r>
+            <a:r>
+              <a:rPr lang="da-DK" dirty="0"/>
+              <a:t> = false;</a:t>
+            </a:r>
+          </a:p>
+          <a:p>
+            <a:pPr>
+              <a:buFont typeface="+mj-lt"/>
+              <a:buAutoNum type="arabicPeriod" startAt="96"/>
+            </a:pPr>
+            <a:r>
+              <a:rPr lang="da-DK" dirty="0"/>
+              <a:t>        </a:t>
+            </a:r>
+            <a:r>
+              <a:rPr lang="da-DK" dirty="0" err="1"/>
+              <a:t>someoneHasWon</a:t>
+            </a:r>
+            <a:r>
+              <a:rPr lang="da-DK" dirty="0"/>
+              <a:t> = false;</a:t>
+            </a:r>
+          </a:p>
+          <a:p>
+            <a:pPr>
+              <a:buFont typeface="+mj-lt"/>
+              <a:buAutoNum type="arabicPeriod" startAt="96"/>
+            </a:pPr>
+            <a:r>
+              <a:rPr lang="da-DK" dirty="0"/>
+              <a:t>        </a:t>
+            </a:r>
+            <a:r>
+              <a:rPr lang="da-DK" dirty="0" err="1"/>
+              <a:t>currentGame</a:t>
+            </a:r>
+            <a:r>
+              <a:rPr lang="da-DK" dirty="0"/>
+              <a:t> = </a:t>
+            </a:r>
+            <a:r>
+              <a:rPr lang="da-DK" dirty="0" err="1"/>
+              <a:t>MakeNewGame</a:t>
+            </a:r>
+            <a:r>
+              <a:rPr lang="da-DK" dirty="0"/>
+              <a:t>();</a:t>
+            </a:r>
+          </a:p>
+          <a:p>
+            <a:pPr>
+              <a:buFont typeface="+mj-lt"/>
+              <a:buAutoNum type="arabicPeriod" startAt="96"/>
+            </a:pPr>
+            <a:r>
+              <a:rPr lang="da-DK" dirty="0"/>
+              <a:t>        </a:t>
+            </a:r>
+            <a:r>
+              <a:rPr lang="da-DK" dirty="0" err="1"/>
+              <a:t>NextMove</a:t>
+            </a:r>
+            <a:r>
+              <a:rPr lang="da-DK" dirty="0"/>
+              <a:t>(</a:t>
+            </a:r>
+            <a:r>
+              <a:rPr lang="da-DK" dirty="0" err="1"/>
+              <a:t>xIsAI</a:t>
+            </a:r>
+            <a:r>
+              <a:rPr lang="da-DK" dirty="0"/>
+              <a:t>);</a:t>
+            </a:r>
+          </a:p>
+          <a:p>
+            <a:pPr>
+              <a:buFont typeface="+mj-lt"/>
+              <a:buAutoNum type="arabicPeriod" startAt="96"/>
+            </a:pPr>
+            <a:r>
+              <a:rPr lang="da-DK" dirty="0"/>
+              <a:t>    }</a:t>
+            </a:r>
+          </a:p>
+        </p:txBody>
+      </p:sp>
+    </p:spTree>
+    <p:extLst>
+      <p:ext uri="{BB962C8B-B14F-4D97-AF65-F5344CB8AC3E}">
+        <p14:creationId xmlns:p14="http://schemas.microsoft.com/office/powerpoint/2010/main" val="3087275727"/>
+      </p:ext>
+    </p:extLst>
+  </p:cSld>
+  <p:clrMapOvr>
+    <a:masterClrMapping/>
+  </p:clrMapOvr>
+</p:sld>
+</file>
+
 <file path=ppt/slides/slide2.xml><?xml version="1.0" encoding="utf-8"?>
 <p:sld xmlns:a="http://schemas.openxmlformats.org/drawingml/2006/main" xmlns:r="http://schemas.openxmlformats.org/officeDocument/2006/relationships" xmlns:p="http://schemas.openxmlformats.org/presentationml/2006/main">
   <p:cSld>
@@ -6808,7 +7760,51 @@
           <a:bodyPr/>
           <a:lstStyle/>
           <a:p>
-            <a:endParaRPr lang="da-DK"/>
+            <a:r>
+              <a:rPr lang="da-DK" dirty="0"/>
+              <a:t>Lavet med </a:t>
+            </a:r>
+            <a:r>
+              <a:rPr lang="da-DK" dirty="0" err="1"/>
+              <a:t>Unity</a:t>
+            </a:r>
+            <a:r>
+              <a:rPr lang="da-DK" dirty="0"/>
+              <a:t> UI</a:t>
+            </a:r>
+          </a:p>
+          <a:p>
+            <a:r>
+              <a:rPr lang="da-DK" dirty="0"/>
+              <a:t>Fremvisning af board</a:t>
+            </a:r>
+          </a:p>
+          <a:p>
+            <a:r>
+              <a:rPr lang="da-DK" dirty="0"/>
+              <a:t>Input fra board</a:t>
+            </a:r>
+          </a:p>
+          <a:p>
+            <a:r>
+              <a:rPr lang="da-DK" dirty="0"/>
+              <a:t>Opdatering af board</a:t>
+            </a:r>
+          </a:p>
+          <a:p>
+            <a:r>
+              <a:rPr lang="da-DK" dirty="0"/>
+              <a:t>Valg af spiller og start</a:t>
+            </a:r>
+          </a:p>
+          <a:p>
+            <a:r>
+              <a:rPr lang="da-DK" dirty="0"/>
+              <a:t>Game Restart</a:t>
+            </a:r>
+          </a:p>
+          <a:p>
+            <a:endParaRPr lang="da-DK" dirty="0"/>
           </a:p>
         </p:txBody>
       </p:sp>
@@ -7035,11 +8031,11 @@
               <a:buAutoNum type="arabicPeriod" startAt="32"/>
             </a:pPr>
             <a:r>
-              <a:rPr lang="da-DK" dirty="0" err="1"/>
+              <a:rPr lang="da-DK" sz="1100" dirty="0" err="1"/>
               <a:t>int</a:t>
             </a:r>
             <a:r>
-              <a:rPr lang="da-DK" dirty="0"/>
+              <a:rPr lang="da-DK" sz="1100" dirty="0"/>
               <a:t> k = 0;</a:t>
             </a:r>
           </a:p>
@@ -7049,7 +8045,7 @@
               <a:buAutoNum type="arabicPeriod" startAt="32"/>
             </a:pPr>
             <a:r>
-              <a:rPr lang="nn-NO" dirty="0"/>
+              <a:rPr lang="nn-NO" sz="1100" dirty="0"/>
               <a:t>for (int i = 0; i &lt; 3; i++)</a:t>
             </a:r>
           </a:p>
@@ -7059,7 +8055,7 @@
               <a:buAutoNum type="arabicPeriod" startAt="32"/>
             </a:pPr>
             <a:r>
-              <a:rPr lang="da-DK" dirty="0"/>
+              <a:rPr lang="da-DK" sz="1100" dirty="0"/>
               <a:t>{</a:t>
             </a:r>
           </a:p>
@@ -7069,15 +8065,15 @@
               <a:buAutoNum type="arabicPeriod" startAt="32"/>
             </a:pPr>
             <a:r>
-              <a:rPr lang="da-DK" dirty="0"/>
+              <a:rPr lang="da-DK" sz="1100" dirty="0"/>
               <a:t>    for (</a:t>
             </a:r>
             <a:r>
-              <a:rPr lang="da-DK" dirty="0" err="1"/>
+              <a:rPr lang="da-DK" sz="1100" dirty="0" err="1"/>
               <a:t>int</a:t>
             </a:r>
             <a:r>
-              <a:rPr lang="da-DK" dirty="0"/>
+              <a:rPr lang="da-DK" sz="1100" dirty="0"/>
               <a:t> j = 0; j &lt; 3; j++)</a:t>
             </a:r>
           </a:p>
@@ -7087,7 +8083,7 @@
               <a:buAutoNum type="arabicPeriod" startAt="32"/>
             </a:pPr>
             <a:r>
-              <a:rPr lang="da-DK" dirty="0"/>
+              <a:rPr lang="da-DK" sz="1100" dirty="0"/>
               <a:t>    {</a:t>
             </a:r>
           </a:p>
@@ -7097,47 +8093,47 @@
               <a:buAutoNum type="arabicPeriod" startAt="32"/>
             </a:pPr>
             <a:r>
-              <a:rPr lang="da-DK" dirty="0"/>
+              <a:rPr lang="da-DK" sz="1100" dirty="0"/>
               <a:t>        </a:t>
             </a:r>
             <a:r>
-              <a:rPr lang="da-DK" dirty="0" err="1"/>
+              <a:rPr lang="da-DK" sz="1100" dirty="0" err="1"/>
               <a:t>playingFieldText</a:t>
             </a:r>
             <a:r>
-              <a:rPr lang="da-DK" dirty="0"/>
+              <a:rPr lang="da-DK" sz="1100" dirty="0"/>
               <a:t>[i, j] = </a:t>
             </a:r>
             <a:r>
-              <a:rPr lang="da-DK" dirty="0" err="1"/>
+              <a:rPr lang="da-DK" sz="1100" dirty="0" err="1"/>
               <a:t>playingBoard.transform.GetChild</a:t>
             </a:r>
             <a:r>
-              <a:rPr lang="da-DK" dirty="0"/>
+              <a:rPr lang="da-DK" sz="1100" dirty="0"/>
               <a:t>(k).</a:t>
             </a:r>
             <a:r>
-              <a:rPr lang="da-DK" dirty="0" err="1"/>
+              <a:rPr lang="da-DK" sz="1100" dirty="0" err="1"/>
               <a:t>GetChild</a:t>
             </a:r>
             <a:r>
-              <a:rPr lang="da-DK" dirty="0"/>
+              <a:rPr lang="da-DK" sz="1100" dirty="0"/>
               <a:t>(0).</a:t>
             </a:r>
             <a:r>
-              <a:rPr lang="da-DK" dirty="0" err="1"/>
+              <a:rPr lang="da-DK" sz="1100" dirty="0" err="1"/>
               <a:t>GetComponent</a:t>
             </a:r>
             <a:r>
-              <a:rPr lang="da-DK" dirty="0"/>
+              <a:rPr lang="da-DK" sz="1100" dirty="0"/>
               <a:t>&lt;</a:t>
             </a:r>
             <a:r>
-              <a:rPr lang="da-DK" dirty="0" err="1"/>
+              <a:rPr lang="da-DK" sz="1100" dirty="0" err="1"/>
               <a:t>Text</a:t>
             </a:r>
             <a:r>
-              <a:rPr lang="da-DK" dirty="0"/>
+              <a:rPr lang="da-DK" sz="1100" dirty="0"/>
               <a:t>&gt;();</a:t>
             </a:r>
           </a:p>
@@ -7147,7 +8143,7 @@
               <a:buAutoNum type="arabicPeriod" startAt="32"/>
             </a:pPr>
             <a:r>
-              <a:rPr lang="da-DK" dirty="0"/>
+              <a:rPr lang="da-DK" sz="1100" dirty="0"/>
               <a:t>k++;</a:t>
             </a:r>
           </a:p>
@@ -7157,7 +8153,7 @@
               <a:buAutoNum type="arabicPeriod" startAt="32"/>
             </a:pPr>
             <a:r>
-              <a:rPr lang="da-DK" dirty="0"/>
+              <a:rPr lang="da-DK" sz="1100" dirty="0"/>
               <a:t>    }</a:t>
             </a:r>
           </a:p>
@@ -7167,7 +8163,7 @@
               <a:buAutoNum type="arabicPeriod" startAt="32"/>
             </a:pPr>
             <a:r>
-              <a:rPr lang="da-DK" dirty="0"/>
+              <a:rPr lang="da-DK" sz="1100" dirty="0"/>
               <a:t>}</a:t>
             </a:r>
           </a:p>
@@ -7195,8 +8191,38 @@
         </p:blipFill>
         <p:spPr>
           <a:xfrm>
-            <a:off x="9800159" y="4680997"/>
+            <a:off x="7257068" y="4338097"/>
             <a:ext cx="1905014" cy="1776425"/>
+          </a:xfrm>
+          <a:prstGeom prst="rect">
+            <a:avLst/>
+          </a:prstGeom>
+        </p:spPr>
+      </p:pic>
+      <p:pic>
+        <p:nvPicPr>
+          <p:cNvPr id="12" name="Billede 11">
+            <a:extLst>
+              <a:ext uri="{FF2B5EF4-FFF2-40B4-BE49-F238E27FC236}">
+                <a16:creationId xmlns:a16="http://schemas.microsoft.com/office/drawing/2014/main" id="{26124B76-2A7F-4653-A604-1B2E8BCEF558}"/>
+              </a:ext>
+            </a:extLst>
+          </p:cNvPr>
+          <p:cNvPicPr>
+            <a:picLocks noChangeAspect="1"/>
+          </p:cNvPicPr>
+          <p:nvPr/>
+        </p:nvPicPr>
+        <p:blipFill>
+          <a:blip r:embed="rId3"/>
+          <a:stretch>
+            <a:fillRect/>
+          </a:stretch>
+        </p:blipFill>
+        <p:spPr>
+          <a:xfrm>
+            <a:off x="7145149" y="1270000"/>
+            <a:ext cx="2128853" cy="2143141"/>
           </a:xfrm>
           <a:prstGeom prst="rect">
             <a:avLst/>
@@ -7280,323 +8306,431 @@
         <p:spPr/>
         <p:txBody>
           <a:bodyPr>
-            <a:normAutofit fontScale="40000" lnSpcReduction="20000"/>
+            <a:normAutofit/>
           </a:bodyPr>
           <a:lstStyle/>
           <a:p>
             <a:pPr>
+              <a:lnSpc>
+                <a:spcPct val="120000"/>
+              </a:lnSpc>
+              <a:spcBef>
+                <a:spcPts val="0"/>
+              </a:spcBef>
               <a:buFont typeface="+mj-lt"/>
               <a:buAutoNum type="arabicPeriod" startAt="45"/>
             </a:pPr>
             <a:r>
-              <a:rPr lang="da-DK" dirty="0" err="1"/>
+              <a:rPr lang="da-DK" sz="1100" dirty="0" err="1"/>
               <a:t>if</a:t>
             </a:r>
             <a:r>
-              <a:rPr lang="da-DK" dirty="0"/>
+              <a:rPr lang="da-DK" sz="1100" dirty="0"/>
               <a:t> (</a:t>
             </a:r>
             <a:r>
-              <a:rPr lang="da-DK" dirty="0" err="1"/>
+              <a:rPr lang="da-DK" sz="1100" dirty="0" err="1"/>
               <a:t>currentGame</a:t>
             </a:r>
             <a:r>
-              <a:rPr lang="da-DK" dirty="0"/>
+              <a:rPr lang="da-DK" sz="1100" dirty="0"/>
               <a:t> != </a:t>
             </a:r>
             <a:r>
-              <a:rPr lang="da-DK" dirty="0" err="1"/>
+              <a:rPr lang="da-DK" sz="1100" dirty="0" err="1"/>
               <a:t>null</a:t>
             </a:r>
             <a:r>
-              <a:rPr lang="da-DK" dirty="0"/>
+              <a:rPr lang="da-DK" sz="1100" dirty="0"/>
               <a:t> &amp;&amp; !</a:t>
             </a:r>
             <a:r>
-              <a:rPr lang="da-DK" dirty="0" err="1"/>
+              <a:rPr lang="da-DK" sz="1100" dirty="0" err="1"/>
               <a:t>someoneHasWon</a:t>
             </a:r>
             <a:r>
-              <a:rPr lang="da-DK" dirty="0"/>
+              <a:rPr lang="da-DK" sz="1100" dirty="0"/>
               <a:t>)</a:t>
             </a:r>
           </a:p>
           <a:p>
             <a:pPr>
+              <a:lnSpc>
+                <a:spcPct val="120000"/>
+              </a:lnSpc>
+              <a:spcBef>
+                <a:spcPts val="0"/>
+              </a:spcBef>
               <a:buFont typeface="+mj-lt"/>
               <a:buAutoNum type="arabicPeriod" startAt="45"/>
             </a:pPr>
             <a:r>
-              <a:rPr lang="da-DK" dirty="0"/>
+              <a:rPr lang="da-DK" sz="1100" dirty="0"/>
               <a:t>{</a:t>
             </a:r>
           </a:p>
           <a:p>
             <a:pPr>
+              <a:lnSpc>
+                <a:spcPct val="120000"/>
+              </a:lnSpc>
+              <a:spcBef>
+                <a:spcPts val="0"/>
+              </a:spcBef>
               <a:buFont typeface="+mj-lt"/>
               <a:buAutoNum type="arabicPeriod" startAt="45"/>
             </a:pPr>
             <a:r>
-              <a:rPr lang="en-US" dirty="0"/>
+              <a:rPr lang="en-US" sz="1100" dirty="0"/>
               <a:t>    </a:t>
             </a:r>
             <a:r>
-              <a:rPr lang="en-US" dirty="0" err="1"/>
+              <a:rPr lang="en-US" sz="1100" dirty="0" err="1"/>
               <a:t>currentPlayerText.text</a:t>
             </a:r>
             <a:r>
-              <a:rPr lang="en-US" dirty="0"/>
+              <a:rPr lang="en-US" sz="1100" dirty="0"/>
               <a:t> = "Current player: " + </a:t>
             </a:r>
             <a:r>
-              <a:rPr lang="en-US" dirty="0" err="1"/>
+              <a:rPr lang="en-US" sz="1100" dirty="0" err="1"/>
               <a:t>currentGame.CurrentPlayer.ToString</a:t>
             </a:r>
             <a:r>
-              <a:rPr lang="en-US" dirty="0"/>
+              <a:rPr lang="en-US" sz="1100" dirty="0"/>
               <a:t>();</a:t>
             </a:r>
           </a:p>
           <a:p>
             <a:pPr>
+              <a:lnSpc>
+                <a:spcPct val="120000"/>
+              </a:lnSpc>
+              <a:spcBef>
+                <a:spcPts val="0"/>
+              </a:spcBef>
               <a:buFont typeface="+mj-lt"/>
               <a:buAutoNum type="arabicPeriod" startAt="45"/>
             </a:pPr>
             <a:r>
-              <a:rPr lang="nn-NO" dirty="0"/>
+              <a:rPr lang="nn-NO" sz="1100" dirty="0"/>
               <a:t>    for (int i = 0; i &lt; 3; i++)</a:t>
             </a:r>
           </a:p>
           <a:p>
             <a:pPr>
+              <a:lnSpc>
+                <a:spcPct val="120000"/>
+              </a:lnSpc>
+              <a:spcBef>
+                <a:spcPts val="0"/>
+              </a:spcBef>
               <a:buFont typeface="+mj-lt"/>
               <a:buAutoNum type="arabicPeriod" startAt="45"/>
             </a:pPr>
             <a:r>
-              <a:rPr lang="da-DK" dirty="0"/>
+              <a:rPr lang="da-DK" sz="1100" dirty="0"/>
               <a:t>    {</a:t>
             </a:r>
           </a:p>
           <a:p>
             <a:pPr>
+              <a:lnSpc>
+                <a:spcPct val="120000"/>
+              </a:lnSpc>
+              <a:spcBef>
+                <a:spcPts val="0"/>
+              </a:spcBef>
               <a:buFont typeface="+mj-lt"/>
               <a:buAutoNum type="arabicPeriod" startAt="45"/>
             </a:pPr>
             <a:r>
-              <a:rPr lang="da-DK" dirty="0"/>
+              <a:rPr lang="da-DK" sz="1100" dirty="0"/>
               <a:t>        for (</a:t>
             </a:r>
             <a:r>
-              <a:rPr lang="da-DK" dirty="0" err="1"/>
+              <a:rPr lang="da-DK" sz="1100" dirty="0" err="1"/>
               <a:t>int</a:t>
             </a:r>
             <a:r>
-              <a:rPr lang="da-DK" dirty="0"/>
+              <a:rPr lang="da-DK" sz="1100" dirty="0"/>
               <a:t> j = 0; j &lt; 3; j++)</a:t>
             </a:r>
           </a:p>
           <a:p>
             <a:pPr>
+              <a:lnSpc>
+                <a:spcPct val="120000"/>
+              </a:lnSpc>
+              <a:spcBef>
+                <a:spcPts val="0"/>
+              </a:spcBef>
               <a:buFont typeface="+mj-lt"/>
               <a:buAutoNum type="arabicPeriod" startAt="45"/>
             </a:pPr>
             <a:r>
-              <a:rPr lang="da-DK" dirty="0"/>
+              <a:rPr lang="da-DK" sz="1100" dirty="0"/>
               <a:t>        {</a:t>
             </a:r>
           </a:p>
           <a:p>
             <a:pPr>
+              <a:lnSpc>
+                <a:spcPct val="120000"/>
+              </a:lnSpc>
+              <a:spcBef>
+                <a:spcPts val="0"/>
+              </a:spcBef>
               <a:buFont typeface="+mj-lt"/>
               <a:buAutoNum type="arabicPeriod" startAt="45"/>
             </a:pPr>
             <a:r>
-              <a:rPr lang="en-US" dirty="0"/>
+              <a:rPr lang="en-US" sz="1100" dirty="0"/>
               <a:t>            if(</a:t>
             </a:r>
             <a:r>
-              <a:rPr lang="en-US" dirty="0" err="1"/>
+              <a:rPr lang="en-US" sz="1100" dirty="0" err="1"/>
               <a:t>currentGame</a:t>
             </a:r>
             <a:r>
-              <a:rPr lang="en-US" dirty="0"/>
+              <a:rPr lang="en-US" sz="1100" dirty="0"/>
               <a:t>[</a:t>
             </a:r>
             <a:r>
-              <a:rPr lang="en-US" dirty="0" err="1"/>
+              <a:rPr lang="en-US" sz="1100" dirty="0" err="1"/>
               <a:t>i,j</a:t>
             </a:r>
             <a:r>
-              <a:rPr lang="en-US" dirty="0"/>
+              <a:rPr lang="en-US" sz="1100" dirty="0"/>
               <a:t>] == </a:t>
             </a:r>
             <a:r>
-              <a:rPr lang="en-US" dirty="0" err="1"/>
+              <a:rPr lang="en-US" sz="1100" dirty="0" err="1"/>
               <a:t>Symbol.N</a:t>
             </a:r>
             <a:r>
-              <a:rPr lang="en-US" dirty="0"/>
+              <a:rPr lang="en-US" sz="1100" dirty="0"/>
               <a:t>)</a:t>
             </a:r>
           </a:p>
           <a:p>
             <a:pPr>
+              <a:lnSpc>
+                <a:spcPct val="120000"/>
+              </a:lnSpc>
+              <a:spcBef>
+                <a:spcPts val="0"/>
+              </a:spcBef>
               <a:buFont typeface="+mj-lt"/>
               <a:buAutoNum type="arabicPeriod" startAt="45"/>
             </a:pPr>
             <a:r>
-              <a:rPr lang="da-DK" dirty="0"/>
+              <a:rPr lang="da-DK" sz="1100" dirty="0"/>
               <a:t>            {</a:t>
             </a:r>
           </a:p>
           <a:p>
             <a:pPr>
+              <a:lnSpc>
+                <a:spcPct val="120000"/>
+              </a:lnSpc>
+              <a:spcBef>
+                <a:spcPts val="0"/>
+              </a:spcBef>
               <a:buFont typeface="+mj-lt"/>
               <a:buAutoNum type="arabicPeriod" startAt="45"/>
             </a:pPr>
             <a:r>
-              <a:rPr lang="da-DK" dirty="0"/>
+              <a:rPr lang="da-DK" sz="1100" dirty="0"/>
               <a:t>                </a:t>
             </a:r>
             <a:r>
-              <a:rPr lang="da-DK" dirty="0" err="1"/>
+              <a:rPr lang="da-DK" sz="1100" dirty="0" err="1"/>
               <a:t>playingFieldText</a:t>
             </a:r>
             <a:r>
-              <a:rPr lang="da-DK" dirty="0"/>
+              <a:rPr lang="da-DK" sz="1100" dirty="0"/>
               <a:t>[i, j].</a:t>
             </a:r>
             <a:r>
-              <a:rPr lang="da-DK" dirty="0" err="1"/>
+              <a:rPr lang="da-DK" sz="1100" dirty="0" err="1"/>
               <a:t>text</a:t>
             </a:r>
             <a:r>
-              <a:rPr lang="da-DK" dirty="0"/>
+              <a:rPr lang="da-DK" sz="1100" dirty="0"/>
               <a:t> = "";</a:t>
             </a:r>
           </a:p>
           <a:p>
             <a:pPr>
+              <a:lnSpc>
+                <a:spcPct val="120000"/>
+              </a:lnSpc>
+              <a:spcBef>
+                <a:spcPts val="0"/>
+              </a:spcBef>
               <a:buFont typeface="+mj-lt"/>
               <a:buAutoNum type="arabicPeriod" startAt="45"/>
             </a:pPr>
             <a:r>
-              <a:rPr lang="da-DK" dirty="0"/>
+              <a:rPr lang="da-DK" sz="1100" dirty="0"/>
               <a:t>            }</a:t>
             </a:r>
           </a:p>
           <a:p>
             <a:pPr>
+              <a:lnSpc>
+                <a:spcPct val="120000"/>
+              </a:lnSpc>
+              <a:spcBef>
+                <a:spcPts val="0"/>
+              </a:spcBef>
               <a:buFont typeface="+mj-lt"/>
               <a:buAutoNum type="arabicPeriod" startAt="45"/>
             </a:pPr>
             <a:r>
-              <a:rPr lang="da-DK" dirty="0"/>
+              <a:rPr lang="da-DK" sz="1100" dirty="0"/>
               <a:t>            </a:t>
             </a:r>
             <a:r>
-              <a:rPr lang="da-DK" dirty="0" err="1"/>
+              <a:rPr lang="da-DK" sz="1100" dirty="0" err="1"/>
               <a:t>else</a:t>
             </a:r>
-            <a:endParaRPr lang="da-DK" dirty="0"/>
-          </a:p>
-          <a:p>
-            <a:pPr>
+            <a:endParaRPr lang="da-DK" sz="1100" dirty="0"/>
+          </a:p>
+          <a:p>
+            <a:pPr>
+              <a:lnSpc>
+                <a:spcPct val="120000"/>
+              </a:lnSpc>
+              <a:spcBef>
+                <a:spcPts val="0"/>
+              </a:spcBef>
               <a:buFont typeface="+mj-lt"/>
               <a:buAutoNum type="arabicPeriod" startAt="45"/>
             </a:pPr>
             <a:r>
-              <a:rPr lang="da-DK" dirty="0"/>
+              <a:rPr lang="da-DK" sz="1100" dirty="0"/>
               <a:t>            {</a:t>
             </a:r>
           </a:p>
           <a:p>
             <a:pPr>
+              <a:lnSpc>
+                <a:spcPct val="120000"/>
+              </a:lnSpc>
+              <a:spcBef>
+                <a:spcPts val="0"/>
+              </a:spcBef>
               <a:buFont typeface="+mj-lt"/>
               <a:buAutoNum type="arabicPeriod" startAt="45"/>
             </a:pPr>
             <a:r>
-              <a:rPr lang="en-US" dirty="0"/>
+              <a:rPr lang="en-US" sz="1100" dirty="0"/>
               <a:t>                </a:t>
             </a:r>
             <a:r>
-              <a:rPr lang="en-US" dirty="0" err="1"/>
+              <a:rPr lang="en-US" sz="1100" dirty="0" err="1"/>
               <a:t>playingFieldText</a:t>
             </a:r>
             <a:r>
-              <a:rPr lang="en-US" dirty="0"/>
+              <a:rPr lang="en-US" sz="1100" dirty="0"/>
               <a:t>[</a:t>
             </a:r>
             <a:r>
-              <a:rPr lang="en-US" dirty="0" err="1"/>
+              <a:rPr lang="en-US" sz="1100" dirty="0" err="1"/>
               <a:t>i</a:t>
             </a:r>
             <a:r>
-              <a:rPr lang="en-US" dirty="0"/>
+              <a:rPr lang="en-US" sz="1100" dirty="0"/>
               <a:t>, j].text = </a:t>
             </a:r>
             <a:r>
-              <a:rPr lang="en-US" dirty="0" err="1"/>
+              <a:rPr lang="en-US" sz="1100" dirty="0" err="1"/>
               <a:t>currentGame</a:t>
             </a:r>
             <a:r>
-              <a:rPr lang="en-US" dirty="0"/>
+              <a:rPr lang="en-US" sz="1100" dirty="0"/>
               <a:t>[</a:t>
             </a:r>
             <a:r>
-              <a:rPr lang="en-US" dirty="0" err="1"/>
+              <a:rPr lang="en-US" sz="1100" dirty="0" err="1"/>
               <a:t>i</a:t>
             </a:r>
             <a:r>
-              <a:rPr lang="en-US" dirty="0"/>
+              <a:rPr lang="en-US" sz="1100" dirty="0"/>
               <a:t>, j].</a:t>
             </a:r>
             <a:r>
-              <a:rPr lang="en-US" dirty="0" err="1"/>
+              <a:rPr lang="en-US" sz="1100" dirty="0" err="1"/>
               <a:t>ToString</a:t>
             </a:r>
             <a:r>
-              <a:rPr lang="en-US" dirty="0"/>
+              <a:rPr lang="en-US" sz="1100" dirty="0"/>
               <a:t>();</a:t>
             </a:r>
           </a:p>
           <a:p>
             <a:pPr>
+              <a:lnSpc>
+                <a:spcPct val="120000"/>
+              </a:lnSpc>
+              <a:spcBef>
+                <a:spcPts val="0"/>
+              </a:spcBef>
               <a:buFont typeface="+mj-lt"/>
               <a:buAutoNum type="arabicPeriod" startAt="45"/>
             </a:pPr>
             <a:r>
-              <a:rPr lang="da-DK" dirty="0"/>
+              <a:rPr lang="da-DK" sz="1100" dirty="0"/>
               <a:t>            }</a:t>
             </a:r>
           </a:p>
           <a:p>
             <a:pPr>
+              <a:lnSpc>
+                <a:spcPct val="120000"/>
+              </a:lnSpc>
+              <a:spcBef>
+                <a:spcPts val="0"/>
+              </a:spcBef>
               <a:buFont typeface="+mj-lt"/>
               <a:buAutoNum type="arabicPeriod" startAt="45"/>
             </a:pPr>
             <a:r>
-              <a:rPr lang="da-DK" dirty="0"/>
+              <a:rPr lang="da-DK" sz="1100" dirty="0"/>
               <a:t>        }</a:t>
             </a:r>
           </a:p>
           <a:p>
             <a:pPr>
+              <a:lnSpc>
+                <a:spcPct val="120000"/>
+              </a:lnSpc>
+              <a:spcBef>
+                <a:spcPts val="0"/>
+              </a:spcBef>
               <a:buFont typeface="+mj-lt"/>
               <a:buAutoNum type="arabicPeriod" startAt="45"/>
             </a:pPr>
             <a:r>
-              <a:rPr lang="da-DK" dirty="0"/>
+              <a:rPr lang="da-DK" sz="1100" dirty="0"/>
               <a:t>    }</a:t>
             </a:r>
           </a:p>
           <a:p>
             <a:pPr>
+              <a:lnSpc>
+                <a:spcPct val="120000"/>
+              </a:lnSpc>
+              <a:spcBef>
+                <a:spcPts val="0"/>
+              </a:spcBef>
               <a:buFont typeface="+mj-lt"/>
               <a:buAutoNum type="arabicPeriod" startAt="45"/>
             </a:pPr>
             <a:r>
-              <a:rPr lang="da-DK" dirty="0"/>
+              <a:rPr lang="da-DK" sz="1100" dirty="0"/>
               <a:t>}</a:t>
             </a:r>
           </a:p>
@@ -7637,6 +8771,305 @@
           <p:cNvPr id="2" name="Titel 1">
             <a:extLst>
               <a:ext uri="{FF2B5EF4-FFF2-40B4-BE49-F238E27FC236}">
+                <a16:creationId xmlns:a16="http://schemas.microsoft.com/office/drawing/2014/main" id="{D78A6CE8-739C-4A76-8DC3-899F590C72AD}"/>
+              </a:ext>
+            </a:extLst>
+          </p:cNvPr>
+          <p:cNvSpPr>
+            <a:spLocks noGrp="1"/>
+          </p:cNvSpPr>
+          <p:nvPr>
+            <p:ph type="title"/>
+          </p:nvPr>
+        </p:nvSpPr>
+        <p:spPr/>
+        <p:txBody>
+          <a:bodyPr/>
+          <a:lstStyle/>
+          <a:p>
+            <a:r>
+              <a:rPr lang="da-DK" dirty="0"/>
+              <a:t>Input fra board</a:t>
+            </a:r>
+          </a:p>
+        </p:txBody>
+      </p:sp>
+      <p:sp>
+        <p:nvSpPr>
+          <p:cNvPr id="3" name="Pladsholder til indhold 2">
+            <a:extLst>
+              <a:ext uri="{FF2B5EF4-FFF2-40B4-BE49-F238E27FC236}">
+                <a16:creationId xmlns:a16="http://schemas.microsoft.com/office/drawing/2014/main" id="{A94D67C5-290D-4729-8BEE-A365725CE317}"/>
+              </a:ext>
+            </a:extLst>
+          </p:cNvPr>
+          <p:cNvSpPr>
+            <a:spLocks noGrp="1"/>
+          </p:cNvSpPr>
+          <p:nvPr>
+            <p:ph idx="1"/>
+          </p:nvPr>
+        </p:nvSpPr>
+        <p:spPr/>
+        <p:txBody>
+          <a:bodyPr>
+            <a:normAutofit fontScale="70000" lnSpcReduction="20000"/>
+          </a:bodyPr>
+          <a:lstStyle/>
+          <a:p>
+            <a:pPr>
+              <a:lnSpc>
+                <a:spcPct val="120000"/>
+              </a:lnSpc>
+              <a:buFont typeface="+mj-lt"/>
+              <a:buAutoNum type="arabicPeriod" startAt="4"/>
+            </a:pPr>
+            <a:r>
+              <a:rPr lang="da-DK" dirty="0"/>
+              <a:t>public class </a:t>
+            </a:r>
+            <a:r>
+              <a:rPr lang="da-DK" dirty="0" err="1"/>
+              <a:t>UiIplayer</a:t>
+            </a:r>
+            <a:r>
+              <a:rPr lang="da-DK" dirty="0"/>
+              <a:t> : </a:t>
+            </a:r>
+            <a:r>
+              <a:rPr lang="da-DK" dirty="0" err="1"/>
+              <a:t>IPlayer</a:t>
+            </a:r>
+            <a:endParaRPr lang="da-DK" dirty="0"/>
+          </a:p>
+          <a:p>
+            <a:pPr>
+              <a:lnSpc>
+                <a:spcPct val="120000"/>
+              </a:lnSpc>
+              <a:buFont typeface="+mj-lt"/>
+              <a:buAutoNum type="arabicPeriod" startAt="4"/>
+            </a:pPr>
+            <a:r>
+              <a:rPr lang="da-DK" dirty="0"/>
+              <a:t>{</a:t>
+            </a:r>
+          </a:p>
+          <a:p>
+            <a:pPr>
+              <a:lnSpc>
+                <a:spcPct val="120000"/>
+              </a:lnSpc>
+              <a:buFont typeface="+mj-lt"/>
+              <a:buAutoNum type="arabicPeriod" startAt="4"/>
+            </a:pPr>
+            <a:r>
+              <a:rPr lang="da-DK" dirty="0"/>
+              <a:t>    </a:t>
+            </a:r>
+            <a:r>
+              <a:rPr lang="da-DK" dirty="0" err="1"/>
+              <a:t>GameManagement</a:t>
+            </a:r>
+            <a:r>
+              <a:rPr lang="da-DK" dirty="0"/>
+              <a:t> manager;</a:t>
+            </a:r>
+          </a:p>
+          <a:p>
+            <a:pPr>
+              <a:lnSpc>
+                <a:spcPct val="120000"/>
+              </a:lnSpc>
+              <a:buFont typeface="+mj-lt"/>
+              <a:buAutoNum type="arabicPeriod" startAt="4"/>
+            </a:pPr>
+            <a:r>
+              <a:rPr lang="da-DK" dirty="0"/>
+              <a:t>    public </a:t>
+            </a:r>
+            <a:r>
+              <a:rPr lang="da-DK" dirty="0" err="1"/>
+              <a:t>UiIplayer</a:t>
+            </a:r>
+            <a:r>
+              <a:rPr lang="da-DK" dirty="0"/>
+              <a:t>(</a:t>
+            </a:r>
+            <a:r>
+              <a:rPr lang="da-DK" dirty="0" err="1"/>
+              <a:t>GameManagement</a:t>
+            </a:r>
+            <a:r>
+              <a:rPr lang="da-DK" dirty="0"/>
+              <a:t> m)</a:t>
+            </a:r>
+          </a:p>
+          <a:p>
+            <a:pPr>
+              <a:lnSpc>
+                <a:spcPct val="120000"/>
+              </a:lnSpc>
+              <a:buFont typeface="+mj-lt"/>
+              <a:buAutoNum type="arabicPeriod" startAt="4"/>
+            </a:pPr>
+            <a:r>
+              <a:rPr lang="da-DK" dirty="0"/>
+              <a:t>    {</a:t>
+            </a:r>
+          </a:p>
+          <a:p>
+            <a:pPr>
+              <a:lnSpc>
+                <a:spcPct val="120000"/>
+              </a:lnSpc>
+              <a:buFont typeface="+mj-lt"/>
+              <a:buAutoNum type="arabicPeriod" startAt="4"/>
+            </a:pPr>
+            <a:r>
+              <a:rPr lang="da-DK" dirty="0"/>
+              <a:t>        manager = m;</a:t>
+            </a:r>
+          </a:p>
+          <a:p>
+            <a:pPr>
+              <a:lnSpc>
+                <a:spcPct val="120000"/>
+              </a:lnSpc>
+              <a:buFont typeface="+mj-lt"/>
+              <a:buAutoNum type="arabicPeriod" startAt="4"/>
+            </a:pPr>
+            <a:r>
+              <a:rPr lang="da-DK" dirty="0"/>
+              <a:t>    }</a:t>
+            </a:r>
+          </a:p>
+          <a:p>
+            <a:pPr>
+              <a:lnSpc>
+                <a:spcPct val="120000"/>
+              </a:lnSpc>
+              <a:buFont typeface="+mj-lt"/>
+              <a:buAutoNum type="arabicPeriod" startAt="4"/>
+            </a:pPr>
+            <a:r>
+              <a:rPr lang="en-US" dirty="0"/>
+              <a:t>    public Placement </a:t>
+            </a:r>
+            <a:r>
+              <a:rPr lang="en-US" dirty="0" err="1"/>
+              <a:t>NextMove</a:t>
+            </a:r>
+            <a:r>
+              <a:rPr lang="en-US" dirty="0"/>
+              <a:t>(Game </a:t>
+            </a:r>
+            <a:r>
+              <a:rPr lang="en-US" dirty="0" err="1"/>
+              <a:t>gameState</a:t>
+            </a:r>
+            <a:r>
+              <a:rPr lang="en-US" dirty="0"/>
+              <a:t>)</a:t>
+            </a:r>
+          </a:p>
+          <a:p>
+            <a:pPr>
+              <a:lnSpc>
+                <a:spcPct val="120000"/>
+              </a:lnSpc>
+              <a:buFont typeface="+mj-lt"/>
+              <a:buAutoNum type="arabicPeriod" startAt="4"/>
+            </a:pPr>
+            <a:r>
+              <a:rPr lang="da-DK" dirty="0"/>
+              <a:t>    {</a:t>
+            </a:r>
+          </a:p>
+          <a:p>
+            <a:pPr>
+              <a:lnSpc>
+                <a:spcPct val="120000"/>
+              </a:lnSpc>
+              <a:buFont typeface="+mj-lt"/>
+              <a:buAutoNum type="arabicPeriod" startAt="4"/>
+            </a:pPr>
+            <a:r>
+              <a:rPr lang="da-DK" dirty="0"/>
+              <a:t>        return </a:t>
+            </a:r>
+            <a:r>
+              <a:rPr lang="da-DK" dirty="0" err="1"/>
+              <a:t>manager.LastValidButtonPress</a:t>
+            </a:r>
+            <a:r>
+              <a:rPr lang="da-DK" dirty="0"/>
+              <a:t>();   </a:t>
+            </a:r>
+          </a:p>
+          <a:p>
+            <a:pPr>
+              <a:lnSpc>
+                <a:spcPct val="120000"/>
+              </a:lnSpc>
+              <a:buFont typeface="+mj-lt"/>
+              <a:buAutoNum type="arabicPeriod" startAt="4"/>
+            </a:pPr>
+            <a:r>
+              <a:rPr lang="da-DK" dirty="0"/>
+              <a:t>    }</a:t>
+            </a:r>
+          </a:p>
+          <a:p>
+            <a:pPr>
+              <a:lnSpc>
+                <a:spcPct val="120000"/>
+              </a:lnSpc>
+              <a:buFont typeface="+mj-lt"/>
+              <a:buAutoNum type="arabicPeriod" startAt="4"/>
+            </a:pPr>
+            <a:r>
+              <a:rPr lang="da-DK" dirty="0"/>
+              <a:t>}</a:t>
+            </a:r>
+          </a:p>
+        </p:txBody>
+      </p:sp>
+    </p:spTree>
+    <p:extLst>
+      <p:ext uri="{BB962C8B-B14F-4D97-AF65-F5344CB8AC3E}">
+        <p14:creationId xmlns:p14="http://schemas.microsoft.com/office/powerpoint/2010/main" val="1453692389"/>
+      </p:ext>
+    </p:extLst>
+  </p:cSld>
+  <p:clrMapOvr>
+    <a:masterClrMapping/>
+  </p:clrMapOvr>
+</p:sld>
+</file>
+
+<file path=ppt/slides/slide7.xml><?xml version="1.0" encoding="utf-8"?>
+<p:sld xmlns:a="http://schemas.openxmlformats.org/drawingml/2006/main" xmlns:r="http://schemas.openxmlformats.org/officeDocument/2006/relationships" xmlns:p="http://schemas.openxmlformats.org/presentationml/2006/main">
+  <p:cSld>
+    <p:spTree>
+      <p:nvGrpSpPr>
+        <p:cNvPr id="1" name=""/>
+        <p:cNvGrpSpPr/>
+        <p:nvPr/>
+      </p:nvGrpSpPr>
+      <p:grpSpPr>
+        <a:xfrm>
+          <a:off x="0" y="0"/>
+          <a:ext cx="0" cy="0"/>
+          <a:chOff x="0" y="0"/>
+          <a:chExt cx="0" cy="0"/>
+        </a:xfrm>
+      </p:grpSpPr>
+      <p:sp>
+        <p:nvSpPr>
+          <p:cNvPr id="2" name="Titel 1">
+            <a:extLst>
+              <a:ext uri="{FF2B5EF4-FFF2-40B4-BE49-F238E27FC236}">
                 <a16:creationId xmlns:a16="http://schemas.microsoft.com/office/drawing/2014/main" id="{31235B90-F92A-49C6-9A75-9E473A78DF75}"/>
               </a:ext>
             </a:extLst>
@@ -7679,317 +9112,419 @@
         <p:spPr/>
         <p:txBody>
           <a:bodyPr>
-            <a:normAutofit fontScale="40000" lnSpcReduction="20000"/>
+            <a:normAutofit/>
           </a:bodyPr>
           <a:lstStyle/>
           <a:p>
             <a:pPr>
+              <a:lnSpc>
+                <a:spcPct val="120000"/>
+              </a:lnSpc>
+              <a:spcBef>
+                <a:spcPts val="0"/>
+              </a:spcBef>
               <a:buFont typeface="+mj-lt"/>
               <a:buAutoNum type="arabicPeriod" startAt="128"/>
             </a:pPr>
             <a:r>
-              <a:rPr lang="da-DK" dirty="0"/>
+              <a:rPr lang="da-DK" sz="1100" dirty="0"/>
               <a:t>public Placement </a:t>
             </a:r>
             <a:r>
-              <a:rPr lang="da-DK" dirty="0" err="1"/>
+              <a:rPr lang="da-DK" sz="1100" dirty="0" err="1"/>
               <a:t>LastValidButtonPress</a:t>
             </a:r>
             <a:r>
-              <a:rPr lang="da-DK" dirty="0"/>
+              <a:rPr lang="da-DK" sz="1100" dirty="0"/>
               <a:t>()</a:t>
             </a:r>
           </a:p>
           <a:p>
             <a:pPr>
+              <a:lnSpc>
+                <a:spcPct val="120000"/>
+              </a:lnSpc>
+              <a:spcBef>
+                <a:spcPts val="0"/>
+              </a:spcBef>
               <a:buFont typeface="+mj-lt"/>
               <a:buAutoNum type="arabicPeriod" startAt="128"/>
             </a:pPr>
             <a:r>
-              <a:rPr lang="da-DK" dirty="0"/>
+              <a:rPr lang="da-DK" sz="1100" dirty="0"/>
               <a:t>    {</a:t>
             </a:r>
           </a:p>
           <a:p>
             <a:pPr>
+              <a:lnSpc>
+                <a:spcPct val="120000"/>
+              </a:lnSpc>
+              <a:spcBef>
+                <a:spcPts val="0"/>
+              </a:spcBef>
               <a:buFont typeface="+mj-lt"/>
               <a:buAutoNum type="arabicPeriod" startAt="128"/>
             </a:pPr>
             <a:r>
-              <a:rPr lang="da-DK" dirty="0"/>
+              <a:rPr lang="da-DK" sz="1100" dirty="0"/>
               <a:t>        </a:t>
             </a:r>
             <a:r>
-              <a:rPr lang="da-DK" dirty="0" err="1"/>
+              <a:rPr lang="da-DK" sz="1100" dirty="0" err="1"/>
               <a:t>userHasPressed</a:t>
             </a:r>
             <a:r>
-              <a:rPr lang="da-DK" dirty="0"/>
+              <a:rPr lang="da-DK" sz="1100" dirty="0"/>
               <a:t> = false;</a:t>
             </a:r>
           </a:p>
           <a:p>
             <a:pPr>
+              <a:lnSpc>
+                <a:spcPct val="120000"/>
+              </a:lnSpc>
+              <a:spcBef>
+                <a:spcPts val="0"/>
+              </a:spcBef>
               <a:buFont typeface="+mj-lt"/>
               <a:buAutoNum type="arabicPeriod" startAt="128"/>
             </a:pPr>
             <a:r>
-              <a:rPr lang="da-DK" dirty="0"/>
+              <a:rPr lang="da-DK" sz="1100" dirty="0"/>
               <a:t>        new </a:t>
             </a:r>
             <a:r>
-              <a:rPr lang="da-DK" dirty="0" err="1"/>
+              <a:rPr lang="da-DK" sz="1100" dirty="0" err="1"/>
               <a:t>WaitWhile</a:t>
             </a:r>
             <a:r>
-              <a:rPr lang="da-DK" dirty="0"/>
+              <a:rPr lang="da-DK" sz="1100" dirty="0"/>
               <a:t>(() =&gt; !</a:t>
             </a:r>
             <a:r>
-              <a:rPr lang="da-DK" dirty="0" err="1"/>
+              <a:rPr lang="da-DK" sz="1100" dirty="0" err="1"/>
               <a:t>userHasPressed</a:t>
             </a:r>
             <a:r>
-              <a:rPr lang="da-DK" dirty="0"/>
+              <a:rPr lang="da-DK" sz="1100" dirty="0"/>
               <a:t>);</a:t>
             </a:r>
           </a:p>
           <a:p>
             <a:pPr>
+              <a:lnSpc>
+                <a:spcPct val="120000"/>
+              </a:lnSpc>
+              <a:spcBef>
+                <a:spcPts val="0"/>
+              </a:spcBef>
               <a:buFont typeface="+mj-lt"/>
               <a:buAutoNum type="arabicPeriod" startAt="128"/>
             </a:pPr>
             <a:r>
-              <a:rPr lang="da-DK" dirty="0"/>
+              <a:rPr lang="da-DK" sz="1100" dirty="0"/>
               <a:t>        return </a:t>
             </a:r>
             <a:r>
-              <a:rPr lang="da-DK" dirty="0" err="1"/>
+              <a:rPr lang="da-DK" sz="1100" dirty="0" err="1"/>
               <a:t>lastPlacePressed</a:t>
             </a:r>
             <a:r>
-              <a:rPr lang="da-DK" dirty="0"/>
+              <a:rPr lang="da-DK" sz="1100" dirty="0"/>
               <a:t>;</a:t>
             </a:r>
           </a:p>
           <a:p>
             <a:pPr>
+              <a:lnSpc>
+                <a:spcPct val="120000"/>
+              </a:lnSpc>
+              <a:spcBef>
+                <a:spcPts val="0"/>
+              </a:spcBef>
               <a:buFont typeface="+mj-lt"/>
               <a:buAutoNum type="arabicPeriod" startAt="128"/>
             </a:pPr>
             <a:r>
-              <a:rPr lang="da-DK" dirty="0"/>
+              <a:rPr lang="da-DK" sz="1100" dirty="0"/>
               <a:t>    }</a:t>
             </a:r>
           </a:p>
           <a:p>
             <a:pPr>
+              <a:lnSpc>
+                <a:spcPct val="120000"/>
+              </a:lnSpc>
+              <a:spcBef>
+                <a:spcPts val="0"/>
+              </a:spcBef>
               <a:buFont typeface="+mj-lt"/>
               <a:buAutoNum type="arabicPeriod" startAt="128"/>
             </a:pPr>
-            <a:endParaRPr lang="da-DK" dirty="0"/>
-          </a:p>
-          <a:p>
-            <a:pPr>
+            <a:endParaRPr lang="da-DK" sz="1100" dirty="0"/>
+          </a:p>
+          <a:p>
+            <a:pPr>
+              <a:lnSpc>
+                <a:spcPct val="120000"/>
+              </a:lnSpc>
+              <a:spcBef>
+                <a:spcPts val="0"/>
+              </a:spcBef>
               <a:buFont typeface="+mj-lt"/>
               <a:buAutoNum type="arabicPeriod" startAt="128"/>
             </a:pPr>
             <a:r>
-              <a:rPr lang="en-US" dirty="0"/>
+              <a:rPr lang="en-US" sz="1100" dirty="0"/>
               <a:t>    public void </a:t>
             </a:r>
             <a:r>
-              <a:rPr lang="en-US" dirty="0" err="1"/>
+              <a:rPr lang="en-US" sz="1100" dirty="0" err="1"/>
               <a:t>BoardPressed</a:t>
             </a:r>
             <a:r>
-              <a:rPr lang="en-US" dirty="0"/>
+              <a:rPr lang="en-US" sz="1100" dirty="0"/>
               <a:t>(Button b)</a:t>
             </a:r>
           </a:p>
           <a:p>
             <a:pPr>
+              <a:lnSpc>
+                <a:spcPct val="120000"/>
+              </a:lnSpc>
+              <a:spcBef>
+                <a:spcPts val="0"/>
+              </a:spcBef>
               <a:buFont typeface="+mj-lt"/>
               <a:buAutoNum type="arabicPeriod" startAt="128"/>
             </a:pPr>
             <a:r>
-              <a:rPr lang="da-DK" dirty="0"/>
+              <a:rPr lang="da-DK" sz="1100" dirty="0"/>
               <a:t>    {</a:t>
             </a:r>
           </a:p>
           <a:p>
             <a:pPr>
+              <a:lnSpc>
+                <a:spcPct val="120000"/>
+              </a:lnSpc>
+              <a:spcBef>
+                <a:spcPts val="0"/>
+              </a:spcBef>
               <a:buFont typeface="+mj-lt"/>
               <a:buAutoNum type="arabicPeriod" startAt="128"/>
             </a:pPr>
             <a:r>
-              <a:rPr lang="da-DK" dirty="0"/>
+              <a:rPr lang="da-DK" sz="1100" dirty="0"/>
               <a:t>        Placement p = new Placement(</a:t>
             </a:r>
             <a:r>
-              <a:rPr lang="da-DK" dirty="0" err="1"/>
+              <a:rPr lang="da-DK" sz="1100" dirty="0" err="1"/>
               <a:t>int.Parse</a:t>
             </a:r>
             <a:r>
-              <a:rPr lang="da-DK" dirty="0"/>
+              <a:rPr lang="da-DK" sz="1100" dirty="0"/>
               <a:t>(</a:t>
             </a:r>
             <a:r>
-              <a:rPr lang="da-DK" dirty="0" err="1"/>
+              <a:rPr lang="da-DK" sz="1100" dirty="0" err="1"/>
               <a:t>b.tag</a:t>
             </a:r>
             <a:r>
-              <a:rPr lang="da-DK" dirty="0"/>
+              <a:rPr lang="da-DK" sz="1100" dirty="0"/>
               <a:t>[0].</a:t>
             </a:r>
             <a:r>
-              <a:rPr lang="da-DK" dirty="0" err="1"/>
+              <a:rPr lang="da-DK" sz="1100" dirty="0" err="1"/>
               <a:t>ToString</a:t>
             </a:r>
             <a:r>
-              <a:rPr lang="da-DK" dirty="0"/>
+              <a:rPr lang="da-DK" sz="1100" dirty="0"/>
               <a:t>()), </a:t>
             </a:r>
             <a:r>
-              <a:rPr lang="da-DK" dirty="0" err="1"/>
+              <a:rPr lang="da-DK" sz="1100" dirty="0" err="1"/>
               <a:t>int.Parse</a:t>
             </a:r>
             <a:r>
-              <a:rPr lang="da-DK" dirty="0"/>
+              <a:rPr lang="da-DK" sz="1100" dirty="0"/>
               <a:t>(</a:t>
             </a:r>
             <a:r>
-              <a:rPr lang="da-DK" dirty="0" err="1"/>
+              <a:rPr lang="da-DK" sz="1100" dirty="0" err="1"/>
               <a:t>b.tag</a:t>
             </a:r>
             <a:r>
-              <a:rPr lang="da-DK" dirty="0"/>
+              <a:rPr lang="da-DK" sz="1100" dirty="0"/>
               <a:t>[1].</a:t>
             </a:r>
             <a:r>
-              <a:rPr lang="da-DK" dirty="0" err="1"/>
+              <a:rPr lang="da-DK" sz="1100" dirty="0" err="1"/>
               <a:t>ToString</a:t>
             </a:r>
             <a:r>
-              <a:rPr lang="da-DK" dirty="0"/>
+              <a:rPr lang="da-DK" sz="1100" dirty="0"/>
               <a:t>()));</a:t>
             </a:r>
           </a:p>
           <a:p>
             <a:pPr>
+              <a:lnSpc>
+                <a:spcPct val="120000"/>
+              </a:lnSpc>
+              <a:spcBef>
+                <a:spcPts val="0"/>
+              </a:spcBef>
               <a:buFont typeface="+mj-lt"/>
               <a:buAutoNum type="arabicPeriod" startAt="128"/>
             </a:pPr>
             <a:r>
-              <a:rPr lang="da-DK" dirty="0"/>
+              <a:rPr lang="da-DK" sz="1100" dirty="0"/>
               <a:t>        </a:t>
             </a:r>
             <a:r>
-              <a:rPr lang="da-DK" dirty="0" err="1"/>
+              <a:rPr lang="da-DK" sz="1100" dirty="0" err="1"/>
               <a:t>if</a:t>
             </a:r>
             <a:r>
-              <a:rPr lang="da-DK" dirty="0"/>
+              <a:rPr lang="da-DK" sz="1100" dirty="0"/>
               <a:t> (</a:t>
             </a:r>
             <a:r>
-              <a:rPr lang="da-DK" dirty="0" err="1"/>
+              <a:rPr lang="da-DK" sz="1100" dirty="0" err="1"/>
               <a:t>currentGame.IsLegalMove</a:t>
             </a:r>
             <a:r>
-              <a:rPr lang="da-DK" dirty="0"/>
+              <a:rPr lang="da-DK" sz="1100" dirty="0"/>
               <a:t>(p))</a:t>
             </a:r>
           </a:p>
           <a:p>
             <a:pPr>
+              <a:lnSpc>
+                <a:spcPct val="120000"/>
+              </a:lnSpc>
+              <a:spcBef>
+                <a:spcPts val="0"/>
+              </a:spcBef>
               <a:buFont typeface="+mj-lt"/>
               <a:buAutoNum type="arabicPeriod" startAt="128"/>
             </a:pPr>
             <a:r>
-              <a:rPr lang="da-DK" dirty="0"/>
+              <a:rPr lang="da-DK" sz="1100" dirty="0"/>
               <a:t>        {</a:t>
             </a:r>
           </a:p>
           <a:p>
             <a:pPr>
+              <a:lnSpc>
+                <a:spcPct val="120000"/>
+              </a:lnSpc>
+              <a:spcBef>
+                <a:spcPts val="0"/>
+              </a:spcBef>
               <a:buFont typeface="+mj-lt"/>
               <a:buAutoNum type="arabicPeriod" startAt="128"/>
             </a:pPr>
             <a:r>
-              <a:rPr lang="da-DK" dirty="0"/>
+              <a:rPr lang="da-DK" sz="1100" dirty="0"/>
               <a:t>            </a:t>
             </a:r>
             <a:r>
-              <a:rPr lang="da-DK" dirty="0" err="1"/>
+              <a:rPr lang="da-DK" sz="1100" dirty="0" err="1"/>
               <a:t>lastPlacePressed</a:t>
             </a:r>
             <a:r>
-              <a:rPr lang="da-DK" dirty="0"/>
+              <a:rPr lang="da-DK" sz="1100" dirty="0"/>
               <a:t> = p;</a:t>
             </a:r>
           </a:p>
           <a:p>
             <a:pPr>
+              <a:lnSpc>
+                <a:spcPct val="120000"/>
+              </a:lnSpc>
+              <a:spcBef>
+                <a:spcPts val="0"/>
+              </a:spcBef>
               <a:buFont typeface="+mj-lt"/>
               <a:buAutoNum type="arabicPeriod" startAt="128"/>
             </a:pPr>
             <a:r>
-              <a:rPr lang="da-DK" dirty="0"/>
+              <a:rPr lang="da-DK" sz="1100" dirty="0"/>
               <a:t>            </a:t>
             </a:r>
             <a:r>
-              <a:rPr lang="da-DK" dirty="0" err="1"/>
+              <a:rPr lang="da-DK" sz="1100" dirty="0" err="1"/>
               <a:t>userHasPressed</a:t>
             </a:r>
             <a:r>
-              <a:rPr lang="da-DK" dirty="0"/>
+              <a:rPr lang="da-DK" sz="1100" dirty="0"/>
               <a:t> = true;</a:t>
             </a:r>
           </a:p>
           <a:p>
             <a:pPr>
+              <a:lnSpc>
+                <a:spcPct val="120000"/>
+              </a:lnSpc>
+              <a:spcBef>
+                <a:spcPts val="0"/>
+              </a:spcBef>
               <a:buFont typeface="+mj-lt"/>
               <a:buAutoNum type="arabicPeriod" startAt="128"/>
             </a:pPr>
             <a:r>
-              <a:rPr lang="da-DK" dirty="0"/>
+              <a:rPr lang="da-DK" sz="1100" dirty="0"/>
               <a:t>            </a:t>
             </a:r>
             <a:r>
-              <a:rPr lang="da-DK" dirty="0" err="1"/>
+              <a:rPr lang="da-DK" sz="1100" dirty="0" err="1"/>
               <a:t>StartCoroutine</a:t>
             </a:r>
             <a:r>
-              <a:rPr lang="da-DK" dirty="0"/>
+              <a:rPr lang="da-DK" sz="1100" dirty="0"/>
               <a:t>(</a:t>
             </a:r>
             <a:r>
-              <a:rPr lang="da-DK" dirty="0" err="1"/>
+              <a:rPr lang="da-DK" sz="1100" dirty="0" err="1"/>
               <a:t>AutoNextMove</a:t>
             </a:r>
             <a:r>
-              <a:rPr lang="da-DK" dirty="0"/>
+              <a:rPr lang="da-DK" sz="1100" dirty="0"/>
               <a:t>());</a:t>
             </a:r>
           </a:p>
           <a:p>
             <a:pPr>
+              <a:lnSpc>
+                <a:spcPct val="120000"/>
+              </a:lnSpc>
+              <a:spcBef>
+                <a:spcPts val="0"/>
+              </a:spcBef>
               <a:buFont typeface="+mj-lt"/>
               <a:buAutoNum type="arabicPeriod" startAt="128"/>
             </a:pPr>
             <a:r>
-              <a:rPr lang="da-DK" dirty="0"/>
+              <a:rPr lang="da-DK" sz="1100" dirty="0"/>
               <a:t>        }</a:t>
             </a:r>
           </a:p>
           <a:p>
             <a:pPr>
+              <a:lnSpc>
+                <a:spcPct val="120000"/>
+              </a:lnSpc>
+              <a:spcBef>
+                <a:spcPts val="0"/>
+              </a:spcBef>
               <a:buFont typeface="+mj-lt"/>
               <a:buAutoNum type="arabicPeriod" startAt="128"/>
             </a:pPr>
             <a:r>
-              <a:rPr lang="da-DK" dirty="0"/>
+              <a:rPr lang="da-DK" sz="1100" dirty="0"/>
               <a:t>    }</a:t>
             </a:r>
           </a:p>
@@ -8098,7 +9633,7 @@
 </p:sld>
 </file>
 
-<file path=ppt/slides/slide7.xml><?xml version="1.0" encoding="utf-8"?>
+<file path=ppt/slides/slide8.xml><?xml version="1.0" encoding="utf-8"?>
 <p:sld xmlns:a="http://schemas.openxmlformats.org/drawingml/2006/main" xmlns:r="http://schemas.openxmlformats.org/officeDocument/2006/relationships" xmlns:p="http://schemas.openxmlformats.org/presentationml/2006/main">
   <p:cSld>
     <p:spTree>
@@ -8167,421 +9702,574 @@
         </p:spPr>
         <p:txBody>
           <a:bodyPr>
-            <a:normAutofit fontScale="25000" lnSpcReduction="20000"/>
+            <a:noAutofit/>
           </a:bodyPr>
           <a:lstStyle/>
           <a:p>
             <a:pPr>
+              <a:lnSpc>
+                <a:spcPct val="120000"/>
+              </a:lnSpc>
+              <a:spcBef>
+                <a:spcPts val="0"/>
+              </a:spcBef>
               <a:buFont typeface="+mj-lt"/>
               <a:buAutoNum type="arabicPeriod" startAt="146"/>
             </a:pPr>
             <a:r>
-              <a:rPr lang="en-US" dirty="0"/>
+              <a:rPr lang="en-US" sz="1100" dirty="0"/>
               <a:t>void </a:t>
             </a:r>
             <a:r>
-              <a:rPr lang="en-US" dirty="0" err="1"/>
+              <a:rPr lang="en-US" sz="1100" dirty="0" err="1"/>
               <a:t>NextMove</a:t>
             </a:r>
             <a:r>
-              <a:rPr lang="en-US" dirty="0"/>
+              <a:rPr lang="en-US" sz="1100" dirty="0"/>
               <a:t>(bool </a:t>
             </a:r>
             <a:r>
-              <a:rPr lang="en-US" dirty="0" err="1"/>
+              <a:rPr lang="en-US" sz="1100" dirty="0" err="1"/>
               <a:t>isAi</a:t>
             </a:r>
             <a:r>
-              <a:rPr lang="en-US" dirty="0"/>
+              <a:rPr lang="en-US" sz="1100" dirty="0"/>
               <a:t> = false)</a:t>
             </a:r>
           </a:p>
           <a:p>
             <a:pPr>
+              <a:lnSpc>
+                <a:spcPct val="120000"/>
+              </a:lnSpc>
+              <a:spcBef>
+                <a:spcPts val="0"/>
+              </a:spcBef>
               <a:buFont typeface="+mj-lt"/>
               <a:buAutoNum type="arabicPeriod" startAt="146"/>
             </a:pPr>
             <a:r>
-              <a:rPr lang="da-DK" dirty="0"/>
+              <a:rPr lang="da-DK" sz="1100" dirty="0"/>
               <a:t>    {</a:t>
             </a:r>
           </a:p>
           <a:p>
             <a:pPr>
+              <a:lnSpc>
+                <a:spcPct val="120000"/>
+              </a:lnSpc>
+              <a:spcBef>
+                <a:spcPts val="0"/>
+              </a:spcBef>
               <a:buFont typeface="+mj-lt"/>
               <a:buAutoNum type="arabicPeriod" startAt="146"/>
             </a:pPr>
             <a:r>
-              <a:rPr lang="da-DK" dirty="0"/>
+              <a:rPr lang="da-DK" sz="1100" dirty="0"/>
               <a:t>        </a:t>
             </a:r>
             <a:r>
-              <a:rPr lang="da-DK" dirty="0" err="1"/>
+              <a:rPr lang="da-DK" sz="1100" dirty="0" err="1"/>
               <a:t>if</a:t>
             </a:r>
             <a:r>
-              <a:rPr lang="da-DK" dirty="0"/>
+              <a:rPr lang="da-DK" sz="1100" dirty="0"/>
               <a:t> (</a:t>
             </a:r>
             <a:r>
-              <a:rPr lang="da-DK" dirty="0" err="1"/>
+              <a:rPr lang="da-DK" sz="1100" dirty="0" err="1"/>
               <a:t>userHasPressed</a:t>
             </a:r>
             <a:r>
-              <a:rPr lang="da-DK" dirty="0"/>
+              <a:rPr lang="da-DK" sz="1100" dirty="0"/>
               <a:t> || </a:t>
             </a:r>
             <a:r>
-              <a:rPr lang="da-DK" dirty="0" err="1"/>
+              <a:rPr lang="da-DK" sz="1100" dirty="0" err="1"/>
               <a:t>isAi</a:t>
             </a:r>
             <a:r>
-              <a:rPr lang="da-DK" dirty="0"/>
+              <a:rPr lang="da-DK" sz="1100" dirty="0"/>
               <a:t>)</a:t>
             </a:r>
           </a:p>
           <a:p>
             <a:pPr>
+              <a:lnSpc>
+                <a:spcPct val="120000"/>
+              </a:lnSpc>
+              <a:spcBef>
+                <a:spcPts val="0"/>
+              </a:spcBef>
               <a:buFont typeface="+mj-lt"/>
               <a:buAutoNum type="arabicPeriod" startAt="146"/>
             </a:pPr>
             <a:r>
-              <a:rPr lang="da-DK" dirty="0"/>
+              <a:rPr lang="da-DK" sz="1100" dirty="0"/>
               <a:t>        {</a:t>
             </a:r>
           </a:p>
           <a:p>
             <a:pPr>
+              <a:lnSpc>
+                <a:spcPct val="120000"/>
+              </a:lnSpc>
+              <a:spcBef>
+                <a:spcPts val="0"/>
+              </a:spcBef>
               <a:buFont typeface="+mj-lt"/>
               <a:buAutoNum type="arabicPeriod" startAt="146"/>
             </a:pPr>
             <a:r>
-              <a:rPr lang="da-DK" dirty="0"/>
+              <a:rPr lang="da-DK" sz="1100" dirty="0"/>
               <a:t>            </a:t>
             </a:r>
             <a:r>
-              <a:rPr lang="da-DK" dirty="0" err="1"/>
+              <a:rPr lang="da-DK" sz="1100" dirty="0" err="1"/>
               <a:t>if</a:t>
             </a:r>
             <a:r>
-              <a:rPr lang="da-DK" dirty="0"/>
+              <a:rPr lang="da-DK" sz="1100" dirty="0"/>
               <a:t> (!</a:t>
             </a:r>
             <a:r>
-              <a:rPr lang="da-DK" dirty="0" err="1"/>
+              <a:rPr lang="da-DK" sz="1100" dirty="0" err="1"/>
               <a:t>currentGame.IsGameDone</a:t>
             </a:r>
             <a:r>
-              <a:rPr lang="da-DK" dirty="0"/>
+              <a:rPr lang="da-DK" sz="1100" dirty="0"/>
               <a:t>)</a:t>
             </a:r>
           </a:p>
           <a:p>
             <a:pPr>
+              <a:lnSpc>
+                <a:spcPct val="120000"/>
+              </a:lnSpc>
+              <a:spcBef>
+                <a:spcPts val="0"/>
+              </a:spcBef>
               <a:buFont typeface="+mj-lt"/>
               <a:buAutoNum type="arabicPeriod" startAt="146"/>
             </a:pPr>
             <a:r>
-              <a:rPr lang="da-DK" dirty="0"/>
+              <a:rPr lang="da-DK" sz="1100" dirty="0"/>
               <a:t>            {</a:t>
             </a:r>
           </a:p>
           <a:p>
             <a:pPr>
+              <a:lnSpc>
+                <a:spcPct val="120000"/>
+              </a:lnSpc>
+              <a:spcBef>
+                <a:spcPts val="0"/>
+              </a:spcBef>
               <a:buFont typeface="+mj-lt"/>
               <a:buAutoNum type="arabicPeriod" startAt="146"/>
             </a:pPr>
             <a:r>
-              <a:rPr lang="da-DK" dirty="0"/>
+              <a:rPr lang="da-DK" sz="1100" dirty="0"/>
               <a:t>                </a:t>
             </a:r>
             <a:r>
-              <a:rPr lang="da-DK" dirty="0" err="1"/>
+              <a:rPr lang="da-DK" sz="1100" dirty="0" err="1"/>
               <a:t>currentGame.NextMove</a:t>
             </a:r>
             <a:r>
-              <a:rPr lang="da-DK" dirty="0"/>
+              <a:rPr lang="da-DK" sz="1100" dirty="0"/>
               <a:t>();</a:t>
             </a:r>
           </a:p>
           <a:p>
             <a:pPr>
+              <a:lnSpc>
+                <a:spcPct val="120000"/>
+              </a:lnSpc>
+              <a:spcBef>
+                <a:spcPts val="0"/>
+              </a:spcBef>
               <a:buFont typeface="+mj-lt"/>
               <a:buAutoNum type="arabicPeriod" startAt="146"/>
             </a:pPr>
             <a:r>
-              <a:rPr lang="en-US" dirty="0"/>
+              <a:rPr lang="en-US" sz="1100" dirty="0"/>
               <a:t>                if (</a:t>
             </a:r>
             <a:r>
-              <a:rPr lang="en-US" dirty="0" err="1"/>
+              <a:rPr lang="en-US" sz="1100" dirty="0" err="1"/>
               <a:t>currentGame.CurrentPlayer</a:t>
             </a:r>
             <a:r>
-              <a:rPr lang="en-US" dirty="0"/>
+              <a:rPr lang="en-US" sz="1100" dirty="0"/>
               <a:t> == </a:t>
             </a:r>
             <a:r>
-              <a:rPr lang="en-US" dirty="0" err="1"/>
+              <a:rPr lang="en-US" sz="1100" dirty="0" err="1"/>
               <a:t>Symbol.X</a:t>
             </a:r>
             <a:r>
-              <a:rPr lang="en-US" dirty="0"/>
+              <a:rPr lang="en-US" sz="1100" dirty="0"/>
               <a:t> &amp;&amp; </a:t>
             </a:r>
             <a:r>
-              <a:rPr lang="en-US" dirty="0" err="1"/>
+              <a:rPr lang="en-US" sz="1100" dirty="0" err="1"/>
               <a:t>playerOneDropdown.value</a:t>
             </a:r>
             <a:r>
-              <a:rPr lang="en-US" dirty="0"/>
+              <a:rPr lang="en-US" sz="1100" dirty="0"/>
               <a:t> == 1)</a:t>
             </a:r>
           </a:p>
           <a:p>
             <a:pPr>
+              <a:lnSpc>
+                <a:spcPct val="120000"/>
+              </a:lnSpc>
+              <a:spcBef>
+                <a:spcPts val="0"/>
+              </a:spcBef>
               <a:buFont typeface="+mj-lt"/>
               <a:buAutoNum type="arabicPeriod" startAt="146"/>
             </a:pPr>
             <a:r>
-              <a:rPr lang="da-DK" dirty="0"/>
+              <a:rPr lang="da-DK" sz="1100" dirty="0"/>
               <a:t>                {</a:t>
             </a:r>
           </a:p>
           <a:p>
             <a:pPr>
+              <a:lnSpc>
+                <a:spcPct val="120000"/>
+              </a:lnSpc>
+              <a:spcBef>
+                <a:spcPts val="0"/>
+              </a:spcBef>
               <a:buFont typeface="+mj-lt"/>
               <a:buAutoNum type="arabicPeriod" startAt="146"/>
             </a:pPr>
             <a:r>
-              <a:rPr lang="da-DK" dirty="0"/>
+              <a:rPr lang="da-DK" sz="1100" dirty="0"/>
               <a:t>                    </a:t>
             </a:r>
             <a:r>
-              <a:rPr lang="da-DK" dirty="0" err="1"/>
+              <a:rPr lang="da-DK" sz="1100" dirty="0" err="1"/>
               <a:t>NextMove</a:t>
             </a:r>
             <a:r>
-              <a:rPr lang="da-DK" dirty="0"/>
+              <a:rPr lang="da-DK" sz="1100" dirty="0"/>
               <a:t>(true);</a:t>
             </a:r>
           </a:p>
           <a:p>
             <a:pPr>
+              <a:lnSpc>
+                <a:spcPct val="120000"/>
+              </a:lnSpc>
+              <a:spcBef>
+                <a:spcPts val="0"/>
+              </a:spcBef>
               <a:buFont typeface="+mj-lt"/>
               <a:buAutoNum type="arabicPeriod" startAt="146"/>
             </a:pPr>
             <a:r>
-              <a:rPr lang="da-DK" dirty="0"/>
+              <a:rPr lang="da-DK" sz="1100" dirty="0"/>
               <a:t>                }</a:t>
             </a:r>
           </a:p>
           <a:p>
             <a:pPr>
+              <a:lnSpc>
+                <a:spcPct val="120000"/>
+              </a:lnSpc>
+              <a:spcBef>
+                <a:spcPts val="0"/>
+              </a:spcBef>
               <a:buFont typeface="+mj-lt"/>
               <a:buAutoNum type="arabicPeriod" startAt="146"/>
             </a:pPr>
             <a:r>
-              <a:rPr lang="en-US" dirty="0"/>
+              <a:rPr lang="en-US" sz="1100" dirty="0"/>
               <a:t>                else if (</a:t>
             </a:r>
             <a:r>
-              <a:rPr lang="en-US" dirty="0" err="1"/>
+              <a:rPr lang="en-US" sz="1100" dirty="0" err="1"/>
               <a:t>currentGame.CurrentPlayer</a:t>
             </a:r>
             <a:r>
-              <a:rPr lang="en-US" dirty="0"/>
+              <a:rPr lang="en-US" sz="1100" dirty="0"/>
               <a:t> == </a:t>
             </a:r>
             <a:r>
-              <a:rPr lang="en-US" dirty="0" err="1"/>
+              <a:rPr lang="en-US" sz="1100" dirty="0" err="1"/>
               <a:t>Symbol.O</a:t>
             </a:r>
             <a:r>
-              <a:rPr lang="en-US" dirty="0"/>
+              <a:rPr lang="en-US" sz="1100" dirty="0"/>
               <a:t> &amp;&amp; </a:t>
             </a:r>
             <a:r>
-              <a:rPr lang="en-US" dirty="0" err="1"/>
+              <a:rPr lang="en-US" sz="1100" dirty="0" err="1"/>
               <a:t>playerTwoDropdown.value</a:t>
             </a:r>
             <a:r>
-              <a:rPr lang="en-US" dirty="0"/>
+              <a:rPr lang="en-US" sz="1100" dirty="0"/>
               <a:t> == 1)</a:t>
             </a:r>
           </a:p>
           <a:p>
             <a:pPr>
+              <a:lnSpc>
+                <a:spcPct val="120000"/>
+              </a:lnSpc>
+              <a:spcBef>
+                <a:spcPts val="0"/>
+              </a:spcBef>
               <a:buFont typeface="+mj-lt"/>
               <a:buAutoNum type="arabicPeriod" startAt="146"/>
             </a:pPr>
             <a:r>
-              <a:rPr lang="da-DK" dirty="0"/>
+              <a:rPr lang="da-DK" sz="1100" dirty="0"/>
               <a:t>                {</a:t>
             </a:r>
           </a:p>
           <a:p>
             <a:pPr>
+              <a:lnSpc>
+                <a:spcPct val="120000"/>
+              </a:lnSpc>
+              <a:spcBef>
+                <a:spcPts val="0"/>
+              </a:spcBef>
               <a:buFont typeface="+mj-lt"/>
               <a:buAutoNum type="arabicPeriod" startAt="146"/>
             </a:pPr>
             <a:r>
-              <a:rPr lang="da-DK" dirty="0"/>
+              <a:rPr lang="da-DK" sz="1100" dirty="0"/>
               <a:t>                    </a:t>
             </a:r>
             <a:r>
-              <a:rPr lang="da-DK" dirty="0" err="1"/>
+              <a:rPr lang="da-DK" sz="1100" dirty="0" err="1"/>
               <a:t>NextMove</a:t>
             </a:r>
             <a:r>
-              <a:rPr lang="da-DK" dirty="0"/>
+              <a:rPr lang="da-DK" sz="1100" dirty="0"/>
               <a:t>(true);</a:t>
             </a:r>
           </a:p>
           <a:p>
             <a:pPr>
+              <a:lnSpc>
+                <a:spcPct val="120000"/>
+              </a:lnSpc>
+              <a:spcBef>
+                <a:spcPts val="0"/>
+              </a:spcBef>
               <a:buFont typeface="+mj-lt"/>
               <a:buAutoNum type="arabicPeriod" startAt="146"/>
             </a:pPr>
             <a:r>
-              <a:rPr lang="da-DK" dirty="0"/>
+              <a:rPr lang="da-DK" sz="1100" dirty="0"/>
               <a:t>                }</a:t>
             </a:r>
           </a:p>
           <a:p>
             <a:pPr>
+              <a:lnSpc>
+                <a:spcPct val="120000"/>
+              </a:lnSpc>
+              <a:spcBef>
+                <a:spcPts val="0"/>
+              </a:spcBef>
               <a:buFont typeface="+mj-lt"/>
               <a:buAutoNum type="arabicPeriod" startAt="146"/>
             </a:pPr>
             <a:r>
-              <a:rPr lang="da-DK" dirty="0"/>
+              <a:rPr lang="da-DK" sz="1100" dirty="0"/>
               <a:t>            }</a:t>
             </a:r>
           </a:p>
           <a:p>
             <a:pPr>
+              <a:lnSpc>
+                <a:spcPct val="120000"/>
+              </a:lnSpc>
+              <a:spcBef>
+                <a:spcPts val="0"/>
+              </a:spcBef>
               <a:buFont typeface="+mj-lt"/>
               <a:buAutoNum type="arabicPeriod" startAt="146"/>
             </a:pPr>
             <a:r>
-              <a:rPr lang="da-DK" dirty="0"/>
+              <a:rPr lang="da-DK" sz="1100" dirty="0"/>
               <a:t>        }</a:t>
             </a:r>
           </a:p>
           <a:p>
             <a:pPr>
+              <a:lnSpc>
+                <a:spcPct val="120000"/>
+              </a:lnSpc>
+              <a:spcBef>
+                <a:spcPts val="0"/>
+              </a:spcBef>
               <a:buFont typeface="+mj-lt"/>
               <a:buAutoNum type="arabicPeriod" startAt="146"/>
             </a:pPr>
             <a:r>
-              <a:rPr lang="da-DK" dirty="0"/>
+              <a:rPr lang="da-DK" sz="1100" dirty="0"/>
               <a:t>    }</a:t>
             </a:r>
           </a:p>
           <a:p>
             <a:pPr>
+              <a:lnSpc>
+                <a:spcPct val="120000"/>
+              </a:lnSpc>
+              <a:spcBef>
+                <a:spcPts val="0"/>
+              </a:spcBef>
               <a:buFont typeface="+mj-lt"/>
               <a:buAutoNum type="arabicPeriod" startAt="146"/>
             </a:pPr>
-            <a:endParaRPr lang="da-DK" dirty="0"/>
-          </a:p>
-          <a:p>
-            <a:pPr>
+            <a:r>
+              <a:rPr lang="da-DK" sz="1100" dirty="0"/>
+              <a:t> </a:t>
+            </a:r>
+          </a:p>
+          <a:p>
+            <a:pPr>
+              <a:lnSpc>
+                <a:spcPct val="120000"/>
+              </a:lnSpc>
+              <a:spcBef>
+                <a:spcPts val="0"/>
+              </a:spcBef>
               <a:buFont typeface="+mj-lt"/>
               <a:buAutoNum type="arabicPeriod" startAt="146"/>
             </a:pPr>
             <a:r>
-              <a:rPr lang="da-DK" dirty="0"/>
+              <a:rPr lang="da-DK" sz="1100" dirty="0"/>
               <a:t>    </a:t>
             </a:r>
             <a:r>
-              <a:rPr lang="da-DK" dirty="0" err="1"/>
+              <a:rPr lang="da-DK" sz="1100" dirty="0" err="1"/>
               <a:t>IEnumerator</a:t>
             </a:r>
             <a:r>
-              <a:rPr lang="da-DK" dirty="0"/>
+              <a:rPr lang="da-DK" sz="1100" dirty="0"/>
               <a:t> </a:t>
             </a:r>
             <a:r>
-              <a:rPr lang="da-DK" dirty="0" err="1"/>
+              <a:rPr lang="da-DK" sz="1100" dirty="0" err="1"/>
               <a:t>AutoNextMove</a:t>
             </a:r>
             <a:r>
-              <a:rPr lang="da-DK" dirty="0"/>
+              <a:rPr lang="da-DK" sz="1100" dirty="0"/>
               <a:t>()</a:t>
             </a:r>
           </a:p>
           <a:p>
             <a:pPr>
+              <a:lnSpc>
+                <a:spcPct val="120000"/>
+              </a:lnSpc>
+              <a:spcBef>
+                <a:spcPts val="0"/>
+              </a:spcBef>
               <a:buFont typeface="+mj-lt"/>
               <a:buAutoNum type="arabicPeriod" startAt="146"/>
             </a:pPr>
             <a:r>
-              <a:rPr lang="da-DK" dirty="0"/>
+              <a:rPr lang="da-DK" sz="1100" dirty="0"/>
               <a:t>    {</a:t>
             </a:r>
           </a:p>
           <a:p>
             <a:pPr>
+              <a:lnSpc>
+                <a:spcPct val="120000"/>
+              </a:lnSpc>
+              <a:spcBef>
+                <a:spcPts val="0"/>
+              </a:spcBef>
               <a:buFont typeface="+mj-lt"/>
               <a:buAutoNum type="arabicPeriod" startAt="146"/>
             </a:pPr>
             <a:r>
-              <a:rPr lang="da-DK" dirty="0"/>
+              <a:rPr lang="da-DK" sz="1100" dirty="0"/>
               <a:t>        new </a:t>
             </a:r>
             <a:r>
-              <a:rPr lang="da-DK" dirty="0" err="1"/>
+              <a:rPr lang="da-DK" sz="1100" dirty="0" err="1"/>
               <a:t>WaitForSeconds</a:t>
             </a:r>
             <a:r>
-              <a:rPr lang="da-DK" dirty="0"/>
+              <a:rPr lang="da-DK" sz="1100" dirty="0"/>
               <a:t>(0.5f);</a:t>
             </a:r>
           </a:p>
           <a:p>
             <a:pPr>
+              <a:lnSpc>
+                <a:spcPct val="120000"/>
+              </a:lnSpc>
+              <a:spcBef>
+                <a:spcPts val="0"/>
+              </a:spcBef>
               <a:buFont typeface="+mj-lt"/>
               <a:buAutoNum type="arabicPeriod" startAt="146"/>
             </a:pPr>
             <a:r>
-              <a:rPr lang="da-DK" dirty="0"/>
+              <a:rPr lang="da-DK" sz="1100" dirty="0"/>
               <a:t>        </a:t>
             </a:r>
             <a:r>
-              <a:rPr lang="da-DK" dirty="0" err="1"/>
+              <a:rPr lang="da-DK" sz="1100" dirty="0" err="1"/>
               <a:t>NextMove</a:t>
             </a:r>
             <a:r>
-              <a:rPr lang="da-DK" dirty="0"/>
+              <a:rPr lang="da-DK" sz="1100" dirty="0"/>
               <a:t>();</a:t>
             </a:r>
           </a:p>
           <a:p>
             <a:pPr>
+              <a:lnSpc>
+                <a:spcPct val="120000"/>
+              </a:lnSpc>
+              <a:spcBef>
+                <a:spcPts val="0"/>
+              </a:spcBef>
               <a:buFont typeface="+mj-lt"/>
               <a:buAutoNum type="arabicPeriod" startAt="146"/>
             </a:pPr>
             <a:r>
-              <a:rPr lang="en-US" dirty="0"/>
+              <a:rPr lang="en-US" sz="1100" dirty="0"/>
               <a:t>        yield return new </a:t>
             </a:r>
             <a:r>
-              <a:rPr lang="en-US" dirty="0" err="1"/>
+              <a:rPr lang="en-US" sz="1100" dirty="0" err="1"/>
               <a:t>WaitForSeconds</a:t>
             </a:r>
             <a:r>
-              <a:rPr lang="en-US" dirty="0"/>
+              <a:rPr lang="en-US" sz="1100" dirty="0"/>
               <a:t>(0.5f);</a:t>
             </a:r>
           </a:p>
           <a:p>
             <a:pPr>
+              <a:lnSpc>
+                <a:spcPct val="120000"/>
+              </a:lnSpc>
+              <a:spcBef>
+                <a:spcPts val="0"/>
+              </a:spcBef>
               <a:buFont typeface="+mj-lt"/>
               <a:buAutoNum type="arabicPeriod" startAt="146"/>
             </a:pPr>
             <a:r>
-              <a:rPr lang="da-DK" dirty="0"/>
+              <a:rPr lang="da-DK" sz="1100" dirty="0"/>
               <a:t>    }</a:t>
             </a:r>
           </a:p>
@@ -8591,6 +10279,611 @@
     <p:extLst>
       <p:ext uri="{BB962C8B-B14F-4D97-AF65-F5344CB8AC3E}">
         <p14:creationId xmlns:p14="http://schemas.microsoft.com/office/powerpoint/2010/main" val="1056466558"/>
+      </p:ext>
+    </p:extLst>
+  </p:cSld>
+  <p:clrMapOvr>
+    <a:masterClrMapping/>
+  </p:clrMapOvr>
+</p:sld>
+</file>
+
+<file path=ppt/slides/slide9.xml><?xml version="1.0" encoding="utf-8"?>
+<p:sld xmlns:a="http://schemas.openxmlformats.org/drawingml/2006/main" xmlns:r="http://schemas.openxmlformats.org/officeDocument/2006/relationships" xmlns:p="http://schemas.openxmlformats.org/presentationml/2006/main">
+  <p:cSld>
+    <p:spTree>
+      <p:nvGrpSpPr>
+        <p:cNvPr id="1" name=""/>
+        <p:cNvGrpSpPr/>
+        <p:nvPr/>
+      </p:nvGrpSpPr>
+      <p:grpSpPr>
+        <a:xfrm>
+          <a:off x="0" y="0"/>
+          <a:ext cx="0" cy="0"/>
+          <a:chOff x="0" y="0"/>
+          <a:chExt cx="0" cy="0"/>
+        </a:xfrm>
+      </p:grpSpPr>
+      <p:sp>
+        <p:nvSpPr>
+          <p:cNvPr id="2" name="Titel 1">
+            <a:extLst>
+              <a:ext uri="{FF2B5EF4-FFF2-40B4-BE49-F238E27FC236}">
+                <a16:creationId xmlns:a16="http://schemas.microsoft.com/office/drawing/2014/main" id="{252A9ECF-4D6D-4E79-9ACB-9B5B43AA2C8B}"/>
+              </a:ext>
+            </a:extLst>
+          </p:cNvPr>
+          <p:cNvSpPr>
+            <a:spLocks noGrp="1"/>
+          </p:cNvSpPr>
+          <p:nvPr>
+            <p:ph type="title"/>
+          </p:nvPr>
+        </p:nvSpPr>
+        <p:spPr/>
+        <p:txBody>
+          <a:bodyPr/>
+          <a:lstStyle/>
+          <a:p>
+            <a:r>
+              <a:rPr lang="da-DK" dirty="0"/>
+              <a:t>Opdatering af board</a:t>
+            </a:r>
+          </a:p>
+        </p:txBody>
+      </p:sp>
+      <p:sp>
+        <p:nvSpPr>
+          <p:cNvPr id="3" name="Pladsholder til indhold 2">
+            <a:extLst>
+              <a:ext uri="{FF2B5EF4-FFF2-40B4-BE49-F238E27FC236}">
+                <a16:creationId xmlns:a16="http://schemas.microsoft.com/office/drawing/2014/main" id="{0B25F96B-511E-4F82-B8FB-0ED9208E990E}"/>
+              </a:ext>
+            </a:extLst>
+          </p:cNvPr>
+          <p:cNvSpPr>
+            <a:spLocks noGrp="1"/>
+          </p:cNvSpPr>
+          <p:nvPr>
+            <p:ph idx="1"/>
+          </p:nvPr>
+        </p:nvSpPr>
+        <p:spPr>
+          <a:xfrm>
+            <a:off x="677334" y="1488613"/>
+            <a:ext cx="8596668" cy="3880773"/>
+          </a:xfrm>
+        </p:spPr>
+        <p:txBody>
+          <a:bodyPr>
+            <a:noAutofit/>
+          </a:bodyPr>
+          <a:lstStyle/>
+          <a:p>
+            <a:pPr>
+              <a:lnSpc>
+                <a:spcPct val="120000"/>
+              </a:lnSpc>
+              <a:spcBef>
+                <a:spcPts val="0"/>
+              </a:spcBef>
+              <a:buFont typeface="+mj-lt"/>
+              <a:buAutoNum type="arabicPeriod" startAt="63"/>
+            </a:pPr>
+            <a:r>
+              <a:rPr lang="da-DK" sz="1100" dirty="0" err="1"/>
+              <a:t>if</a:t>
+            </a:r>
+            <a:r>
+              <a:rPr lang="da-DK" sz="1100" dirty="0"/>
+              <a:t> (</a:t>
+            </a:r>
+            <a:r>
+              <a:rPr lang="da-DK" sz="1100" dirty="0" err="1"/>
+              <a:t>currentGame</a:t>
+            </a:r>
+            <a:r>
+              <a:rPr lang="da-DK" sz="1100" dirty="0"/>
+              <a:t> != </a:t>
+            </a:r>
+            <a:r>
+              <a:rPr lang="da-DK" sz="1100" dirty="0" err="1"/>
+              <a:t>null</a:t>
+            </a:r>
+            <a:r>
+              <a:rPr lang="da-DK" sz="1100" dirty="0"/>
+              <a:t>)</a:t>
+            </a:r>
+          </a:p>
+          <a:p>
+            <a:pPr>
+              <a:lnSpc>
+                <a:spcPct val="120000"/>
+              </a:lnSpc>
+              <a:spcBef>
+                <a:spcPts val="0"/>
+              </a:spcBef>
+              <a:buFont typeface="+mj-lt"/>
+              <a:buAutoNum type="arabicPeriod" startAt="63"/>
+            </a:pPr>
+            <a:r>
+              <a:rPr lang="da-DK" sz="1100" dirty="0"/>
+              <a:t>{</a:t>
+            </a:r>
+          </a:p>
+          <a:p>
+            <a:pPr>
+              <a:lnSpc>
+                <a:spcPct val="120000"/>
+              </a:lnSpc>
+              <a:spcBef>
+                <a:spcPts val="0"/>
+              </a:spcBef>
+              <a:buFont typeface="+mj-lt"/>
+              <a:buAutoNum type="arabicPeriod" startAt="63"/>
+            </a:pPr>
+            <a:r>
+              <a:rPr lang="da-DK" sz="1100" dirty="0"/>
+              <a:t>    </a:t>
+            </a:r>
+            <a:r>
+              <a:rPr lang="da-DK" sz="1100" dirty="0" err="1"/>
+              <a:t>if</a:t>
+            </a:r>
+            <a:r>
+              <a:rPr lang="da-DK" sz="1100" dirty="0"/>
+              <a:t> (</a:t>
+            </a:r>
+            <a:r>
+              <a:rPr lang="da-DK" sz="1100" dirty="0" err="1"/>
+              <a:t>currentGame.IsGameDone</a:t>
+            </a:r>
+            <a:r>
+              <a:rPr lang="da-DK" sz="1100" dirty="0"/>
+              <a:t>)</a:t>
+            </a:r>
+          </a:p>
+          <a:p>
+            <a:pPr>
+              <a:lnSpc>
+                <a:spcPct val="120000"/>
+              </a:lnSpc>
+              <a:spcBef>
+                <a:spcPts val="0"/>
+              </a:spcBef>
+              <a:buFont typeface="+mj-lt"/>
+              <a:buAutoNum type="arabicPeriod" startAt="63"/>
+            </a:pPr>
+            <a:r>
+              <a:rPr lang="da-DK" sz="1100" dirty="0"/>
+              <a:t>    {</a:t>
+            </a:r>
+          </a:p>
+          <a:p>
+            <a:pPr>
+              <a:lnSpc>
+                <a:spcPct val="120000"/>
+              </a:lnSpc>
+              <a:spcBef>
+                <a:spcPts val="0"/>
+              </a:spcBef>
+              <a:buFont typeface="+mj-lt"/>
+              <a:buAutoNum type="arabicPeriod" startAt="63"/>
+            </a:pPr>
+            <a:r>
+              <a:rPr lang="da-DK" sz="1100" dirty="0"/>
+              <a:t>        </a:t>
+            </a:r>
+            <a:r>
+              <a:rPr lang="da-DK" sz="1100" dirty="0" err="1"/>
+              <a:t>someoneHasWon</a:t>
+            </a:r>
+            <a:r>
+              <a:rPr lang="da-DK" sz="1100" dirty="0"/>
+              <a:t> = true;</a:t>
+            </a:r>
+          </a:p>
+          <a:p>
+            <a:pPr>
+              <a:lnSpc>
+                <a:spcPct val="120000"/>
+              </a:lnSpc>
+              <a:spcBef>
+                <a:spcPts val="0"/>
+              </a:spcBef>
+              <a:buFont typeface="+mj-lt"/>
+              <a:buAutoNum type="arabicPeriod" startAt="63"/>
+            </a:pPr>
+            <a:r>
+              <a:rPr lang="da-DK" sz="1100" dirty="0"/>
+              <a:t>        </a:t>
+            </a:r>
+            <a:r>
+              <a:rPr lang="da-DK" sz="1100" dirty="0" err="1"/>
+              <a:t>if</a:t>
+            </a:r>
+            <a:r>
+              <a:rPr lang="da-DK" sz="1100" dirty="0"/>
+              <a:t> (</a:t>
+            </a:r>
+            <a:r>
+              <a:rPr lang="da-DK" sz="1100" dirty="0" err="1"/>
+              <a:t>currentGame.WhoWon</a:t>
+            </a:r>
+            <a:r>
+              <a:rPr lang="da-DK" sz="1100" dirty="0"/>
+              <a:t>() == </a:t>
+            </a:r>
+            <a:r>
+              <a:rPr lang="da-DK" sz="1100" dirty="0" err="1"/>
+              <a:t>null</a:t>
+            </a:r>
+            <a:r>
+              <a:rPr lang="da-DK" sz="1100" dirty="0"/>
+              <a:t>)</a:t>
+            </a:r>
+          </a:p>
+          <a:p>
+            <a:pPr>
+              <a:lnSpc>
+                <a:spcPct val="120000"/>
+              </a:lnSpc>
+              <a:spcBef>
+                <a:spcPts val="0"/>
+              </a:spcBef>
+              <a:buFont typeface="+mj-lt"/>
+              <a:buAutoNum type="arabicPeriod" startAt="63"/>
+            </a:pPr>
+            <a:r>
+              <a:rPr lang="da-DK" sz="1100" dirty="0"/>
+              <a:t>        {</a:t>
+            </a:r>
+          </a:p>
+          <a:p>
+            <a:pPr>
+              <a:lnSpc>
+                <a:spcPct val="120000"/>
+              </a:lnSpc>
+              <a:spcBef>
+                <a:spcPts val="0"/>
+              </a:spcBef>
+              <a:buFont typeface="+mj-lt"/>
+              <a:buAutoNum type="arabicPeriod" startAt="63"/>
+            </a:pPr>
+            <a:r>
+              <a:rPr lang="en-US" sz="1100" dirty="0"/>
+              <a:t>            </a:t>
+            </a:r>
+            <a:r>
+              <a:rPr lang="en-US" sz="1100" dirty="0" err="1"/>
+              <a:t>currentPlayerText.text</a:t>
+            </a:r>
+            <a:r>
+              <a:rPr lang="en-US" sz="1100" dirty="0"/>
+              <a:t> = "The game was a tie";</a:t>
+            </a:r>
+          </a:p>
+          <a:p>
+            <a:pPr>
+              <a:lnSpc>
+                <a:spcPct val="120000"/>
+              </a:lnSpc>
+              <a:spcBef>
+                <a:spcPts val="0"/>
+              </a:spcBef>
+              <a:buFont typeface="+mj-lt"/>
+              <a:buAutoNum type="arabicPeriod" startAt="63"/>
+            </a:pPr>
+            <a:r>
+              <a:rPr lang="da-DK" sz="1100" dirty="0"/>
+              <a:t>        }</a:t>
+            </a:r>
+          </a:p>
+          <a:p>
+            <a:pPr>
+              <a:lnSpc>
+                <a:spcPct val="120000"/>
+              </a:lnSpc>
+              <a:spcBef>
+                <a:spcPts val="0"/>
+              </a:spcBef>
+              <a:buFont typeface="+mj-lt"/>
+              <a:buAutoNum type="arabicPeriod" startAt="63"/>
+            </a:pPr>
+            <a:r>
+              <a:rPr lang="da-DK" sz="1100" dirty="0"/>
+              <a:t>        </a:t>
+            </a:r>
+            <a:r>
+              <a:rPr lang="da-DK" sz="1100" dirty="0" err="1"/>
+              <a:t>else</a:t>
+            </a:r>
+            <a:endParaRPr lang="da-DK" sz="1100" dirty="0"/>
+          </a:p>
+          <a:p>
+            <a:pPr>
+              <a:lnSpc>
+                <a:spcPct val="120000"/>
+              </a:lnSpc>
+              <a:spcBef>
+                <a:spcPts val="0"/>
+              </a:spcBef>
+              <a:buFont typeface="+mj-lt"/>
+              <a:buAutoNum type="arabicPeriod" startAt="63"/>
+            </a:pPr>
+            <a:r>
+              <a:rPr lang="da-DK" sz="1100" dirty="0"/>
+              <a:t>        {</a:t>
+            </a:r>
+          </a:p>
+          <a:p>
+            <a:pPr>
+              <a:lnSpc>
+                <a:spcPct val="120000"/>
+              </a:lnSpc>
+              <a:spcBef>
+                <a:spcPts val="0"/>
+              </a:spcBef>
+              <a:buFont typeface="+mj-lt"/>
+              <a:buAutoNum type="arabicPeriod" startAt="63"/>
+            </a:pPr>
+            <a:r>
+              <a:rPr lang="da-DK" sz="1100" dirty="0"/>
+              <a:t>            </a:t>
+            </a:r>
+            <a:r>
+              <a:rPr lang="da-DK" sz="1100" dirty="0" err="1"/>
+              <a:t>IPlayer</a:t>
+            </a:r>
+            <a:r>
+              <a:rPr lang="da-DK" sz="1100" dirty="0"/>
+              <a:t> </a:t>
+            </a:r>
+            <a:r>
+              <a:rPr lang="da-DK" sz="1100" dirty="0" err="1"/>
+              <a:t>winningPlayer</a:t>
+            </a:r>
+            <a:r>
+              <a:rPr lang="da-DK" sz="1100" dirty="0"/>
+              <a:t> = </a:t>
+            </a:r>
+            <a:r>
+              <a:rPr lang="da-DK" sz="1100" dirty="0" err="1"/>
+              <a:t>currentGame.WhoWon</a:t>
+            </a:r>
+            <a:r>
+              <a:rPr lang="da-DK" sz="1100" dirty="0"/>
+              <a:t>();</a:t>
+            </a:r>
+          </a:p>
+          <a:p>
+            <a:pPr>
+              <a:lnSpc>
+                <a:spcPct val="120000"/>
+              </a:lnSpc>
+              <a:spcBef>
+                <a:spcPts val="0"/>
+              </a:spcBef>
+              <a:buFont typeface="+mj-lt"/>
+              <a:buAutoNum type="arabicPeriod" startAt="63"/>
+            </a:pPr>
+            <a:r>
+              <a:rPr lang="da-DK" sz="1100" dirty="0"/>
+              <a:t>            </a:t>
+            </a:r>
+            <a:r>
+              <a:rPr lang="da-DK" sz="1100" dirty="0" err="1"/>
+              <a:t>if</a:t>
+            </a:r>
+            <a:r>
+              <a:rPr lang="da-DK" sz="1100" dirty="0"/>
+              <a:t> (</a:t>
+            </a:r>
+            <a:r>
+              <a:rPr lang="da-DK" sz="1100" dirty="0" err="1"/>
+              <a:t>winningPlayer</a:t>
+            </a:r>
+            <a:r>
+              <a:rPr lang="da-DK" sz="1100" dirty="0"/>
+              <a:t> == </a:t>
+            </a:r>
+            <a:r>
+              <a:rPr lang="da-DK" sz="1100" dirty="0" err="1"/>
+              <a:t>playerOne</a:t>
+            </a:r>
+            <a:r>
+              <a:rPr lang="da-DK" sz="1100" dirty="0"/>
+              <a:t>)</a:t>
+            </a:r>
+          </a:p>
+          <a:p>
+            <a:pPr>
+              <a:lnSpc>
+                <a:spcPct val="120000"/>
+              </a:lnSpc>
+              <a:spcBef>
+                <a:spcPts val="0"/>
+              </a:spcBef>
+              <a:buFont typeface="+mj-lt"/>
+              <a:buAutoNum type="arabicPeriod" startAt="63"/>
+            </a:pPr>
+            <a:r>
+              <a:rPr lang="da-DK" sz="1100" dirty="0"/>
+              <a:t>            {</a:t>
+            </a:r>
+          </a:p>
+          <a:p>
+            <a:pPr>
+              <a:lnSpc>
+                <a:spcPct val="120000"/>
+              </a:lnSpc>
+              <a:spcBef>
+                <a:spcPts val="0"/>
+              </a:spcBef>
+              <a:buFont typeface="+mj-lt"/>
+              <a:buAutoNum type="arabicPeriod" startAt="63"/>
+            </a:pPr>
+            <a:r>
+              <a:rPr lang="en-US" sz="1100" dirty="0"/>
+              <a:t>                </a:t>
+            </a:r>
+            <a:r>
+              <a:rPr lang="en-US" sz="1100" dirty="0" err="1"/>
+              <a:t>currentPlayerText.text</a:t>
+            </a:r>
+            <a:r>
+              <a:rPr lang="en-US" sz="1100" dirty="0"/>
+              <a:t> = "X has won the game";</a:t>
+            </a:r>
+          </a:p>
+          <a:p>
+            <a:pPr>
+              <a:lnSpc>
+                <a:spcPct val="120000"/>
+              </a:lnSpc>
+              <a:spcBef>
+                <a:spcPts val="0"/>
+              </a:spcBef>
+              <a:buFont typeface="+mj-lt"/>
+              <a:buAutoNum type="arabicPeriod" startAt="63"/>
+            </a:pPr>
+            <a:r>
+              <a:rPr lang="da-DK" sz="1100" dirty="0"/>
+              <a:t>            }</a:t>
+            </a:r>
+          </a:p>
+          <a:p>
+            <a:pPr>
+              <a:lnSpc>
+                <a:spcPct val="120000"/>
+              </a:lnSpc>
+              <a:spcBef>
+                <a:spcPts val="0"/>
+              </a:spcBef>
+              <a:buFont typeface="+mj-lt"/>
+              <a:buAutoNum type="arabicPeriod" startAt="63"/>
+            </a:pPr>
+            <a:r>
+              <a:rPr lang="da-DK" sz="1100" dirty="0"/>
+              <a:t>            </a:t>
+            </a:r>
+            <a:r>
+              <a:rPr lang="da-DK" sz="1100" dirty="0" err="1"/>
+              <a:t>else</a:t>
+            </a:r>
+            <a:endParaRPr lang="da-DK" sz="1100" dirty="0"/>
+          </a:p>
+          <a:p>
+            <a:pPr>
+              <a:lnSpc>
+                <a:spcPct val="120000"/>
+              </a:lnSpc>
+              <a:spcBef>
+                <a:spcPts val="0"/>
+              </a:spcBef>
+              <a:buFont typeface="+mj-lt"/>
+              <a:buAutoNum type="arabicPeriod" startAt="63"/>
+            </a:pPr>
+            <a:r>
+              <a:rPr lang="da-DK" sz="1100" dirty="0"/>
+              <a:t>            {</a:t>
+            </a:r>
+          </a:p>
+          <a:p>
+            <a:pPr>
+              <a:lnSpc>
+                <a:spcPct val="120000"/>
+              </a:lnSpc>
+              <a:spcBef>
+                <a:spcPts val="0"/>
+              </a:spcBef>
+              <a:buFont typeface="+mj-lt"/>
+              <a:buAutoNum type="arabicPeriod" startAt="63"/>
+            </a:pPr>
+            <a:r>
+              <a:rPr lang="en-US" sz="1100" dirty="0"/>
+              <a:t>                </a:t>
+            </a:r>
+            <a:r>
+              <a:rPr lang="en-US" sz="1100" dirty="0" err="1"/>
+              <a:t>currentPlayerText.text</a:t>
+            </a:r>
+            <a:r>
+              <a:rPr lang="en-US" sz="1100" dirty="0"/>
+              <a:t> = "O has won the game";</a:t>
+            </a:r>
+          </a:p>
+          <a:p>
+            <a:pPr>
+              <a:lnSpc>
+                <a:spcPct val="120000"/>
+              </a:lnSpc>
+              <a:spcBef>
+                <a:spcPts val="0"/>
+              </a:spcBef>
+              <a:buFont typeface="+mj-lt"/>
+              <a:buAutoNum type="arabicPeriod" startAt="63"/>
+            </a:pPr>
+            <a:r>
+              <a:rPr lang="da-DK" sz="1100" dirty="0"/>
+              <a:t>            }</a:t>
+            </a:r>
+          </a:p>
+          <a:p>
+            <a:pPr>
+              <a:lnSpc>
+                <a:spcPct val="120000"/>
+              </a:lnSpc>
+              <a:spcBef>
+                <a:spcPts val="0"/>
+              </a:spcBef>
+              <a:buFont typeface="+mj-lt"/>
+              <a:buAutoNum type="arabicPeriod" startAt="63"/>
+            </a:pPr>
+            <a:r>
+              <a:rPr lang="da-DK" sz="1100" dirty="0"/>
+              <a:t>        }</a:t>
+            </a:r>
+          </a:p>
+          <a:p>
+            <a:pPr>
+              <a:lnSpc>
+                <a:spcPct val="120000"/>
+              </a:lnSpc>
+              <a:spcBef>
+                <a:spcPts val="0"/>
+              </a:spcBef>
+              <a:buFont typeface="+mj-lt"/>
+              <a:buAutoNum type="arabicPeriod" startAt="63"/>
+            </a:pPr>
+            <a:r>
+              <a:rPr lang="da-DK" sz="1100" dirty="0"/>
+              <a:t>    }</a:t>
+            </a:r>
+          </a:p>
+          <a:p>
+            <a:pPr>
+              <a:lnSpc>
+                <a:spcPct val="120000"/>
+              </a:lnSpc>
+              <a:spcBef>
+                <a:spcPts val="0"/>
+              </a:spcBef>
+              <a:buFont typeface="+mj-lt"/>
+              <a:buAutoNum type="arabicPeriod" startAt="63"/>
+            </a:pPr>
+            <a:r>
+              <a:rPr lang="da-DK" sz="1100" dirty="0"/>
+              <a:t>}</a:t>
+            </a:r>
+          </a:p>
+        </p:txBody>
+      </p:sp>
+    </p:spTree>
+    <p:extLst>
+      <p:ext uri="{BB962C8B-B14F-4D97-AF65-F5344CB8AC3E}">
+        <p14:creationId xmlns:p14="http://schemas.microsoft.com/office/powerpoint/2010/main" val="1157741341"/>
       </p:ext>
     </p:extLst>
   </p:cSld>

</xml_diff>